<commit_message>
Updated images, poster formatting
</commit_message>
<xml_diff>
--- a/Presentations/Open Repositories 2015/ORCommunities.pptx
+++ b/Presentations/Open Repositories 2015/ORCommunities.pptx
@@ -5,9 +5,9 @@
     <p:sldMasterId id="2147483648" r:id="rId1"/>
   </p:sldMasterIdLst>
   <p:sldIdLst>
-    <p:sldId id="256" r:id="rId2"/>
-    <p:sldId id="257" r:id="rId3"/>
-    <p:sldId id="258" r:id="rId4"/>
+    <p:sldId id="257" r:id="rId2"/>
+    <p:sldId id="258" r:id="rId3"/>
+    <p:sldId id="259" r:id="rId4"/>
   </p:sldIdLst>
   <p:sldSz cx="9144000" cy="6858000" type="screen4x3"/>
   <p:notesSz cx="6858000" cy="9144000"/>
@@ -3083,134 +3083,6 @@
 <file path=ppt/slides/slide1.xml><?xml version="1.0" encoding="utf-8"?>
 <p:sld xmlns:a="http://schemas.openxmlformats.org/drawingml/2006/main" xmlns:r="http://schemas.openxmlformats.org/officeDocument/2006/relationships" xmlns:p="http://schemas.openxmlformats.org/presentationml/2006/main">
   <p:cSld>
-    <p:bg>
-      <p:bgPr>
-        <a:solidFill>
-          <a:schemeClr val="bg1">
-            <a:lumMod val="85000"/>
-          </a:schemeClr>
-        </a:solidFill>
-        <a:effectLst/>
-      </p:bgPr>
-    </p:bg>
-    <p:spTree>
-      <p:nvGrpSpPr>
-        <p:cNvPr id="1" name=""/>
-        <p:cNvGrpSpPr/>
-        <p:nvPr/>
-      </p:nvGrpSpPr>
-      <p:grpSpPr>
-        <a:xfrm>
-          <a:off x="0" y="0"/>
-          <a:ext cx="0" cy="0"/>
-          <a:chOff x="0" y="0"/>
-          <a:chExt cx="0" cy="0"/>
-        </a:xfrm>
-      </p:grpSpPr>
-      <p:sp>
-        <p:nvSpPr>
-          <p:cNvPr id="6" name="TextBox 5"/>
-          <p:cNvSpPr txBox="1"/>
-          <p:nvPr/>
-        </p:nvSpPr>
-        <p:spPr>
-          <a:xfrm>
-            <a:off x="183607" y="214193"/>
-            <a:ext cx="8767223" cy="954107"/>
-          </a:xfrm>
-          <a:prstGeom prst="rect">
-            <a:avLst/>
-          </a:prstGeom>
-          <a:solidFill>
-            <a:schemeClr val="bg1"/>
-          </a:solidFill>
-        </p:spPr>
-        <p:txBody>
-          <a:bodyPr wrap="square" rtlCol="0">
-            <a:spAutoFit/>
-          </a:bodyPr>
-          <a:lstStyle/>
-          <a:p>
-            <a:pPr algn="ctr"/>
-            <a:r>
-              <a:rPr lang="en-US" sz="2800" dirty="0" smtClean="0"/>
-              <a:t>Leveraging Communities to Highlight Scholarly Repository Content</a:t>
-            </a:r>
-            <a:endParaRPr lang="en-US" sz="2800" dirty="0"/>
-          </a:p>
-        </p:txBody>
-      </p:sp>
-      <p:sp>
-        <p:nvSpPr>
-          <p:cNvPr id="8" name="Rectangle 7"/>
-          <p:cNvSpPr/>
-          <p:nvPr/>
-        </p:nvSpPr>
-        <p:spPr>
-          <a:xfrm>
-            <a:off x="183607" y="214193"/>
-            <a:ext cx="8767223" cy="6471688"/>
-          </a:xfrm>
-          <a:prstGeom prst="rect">
-            <a:avLst/>
-          </a:prstGeom>
-          <a:noFill/>
-          <a:ln w="76200" cmpd="sng">
-            <a:solidFill>
-              <a:schemeClr val="tx1">
-                <a:lumMod val="65000"/>
-                <a:lumOff val="35000"/>
-              </a:schemeClr>
-            </a:solidFill>
-          </a:ln>
-          <a:effectLst/>
-        </p:spPr>
-        <p:style>
-          <a:lnRef idx="1">
-            <a:schemeClr val="accent1"/>
-          </a:lnRef>
-          <a:fillRef idx="3">
-            <a:schemeClr val="accent1"/>
-          </a:fillRef>
-          <a:effectRef idx="2">
-            <a:schemeClr val="accent1"/>
-          </a:effectRef>
-          <a:fontRef idx="minor">
-            <a:schemeClr val="lt1"/>
-          </a:fontRef>
-        </p:style>
-        <p:txBody>
-          <a:bodyPr rtlCol="0" anchor="ctr"/>
-          <a:lstStyle/>
-          <a:p>
-            <a:pPr algn="ctr"/>
-            <a:endParaRPr lang="en-US"/>
-          </a:p>
-        </p:txBody>
-      </p:sp>
-    </p:spTree>
-    <p:extLst>
-      <p:ext uri="{BB962C8B-B14F-4D97-AF65-F5344CB8AC3E}">
-        <p14:creationId xmlns:p14="http://schemas.microsoft.com/office/powerpoint/2010/main" val="1053860539"/>
-      </p:ext>
-    </p:extLst>
-  </p:cSld>
-  <p:clrMapOvr>
-    <a:masterClrMapping/>
-  </p:clrMapOvr>
-  <p:timing>
-    <p:tnLst>
-      <p:par>
-        <p:cTn xmlns:p14="http://schemas.microsoft.com/office/powerpoint/2010/main" id="1" dur="indefinite" restart="never" nodeType="tmRoot"/>
-      </p:par>
-    </p:tnLst>
-  </p:timing>
-</p:sld>
-</file>
-
-<file path=ppt/slides/slide2.xml><?xml version="1.0" encoding="utf-8"?>
-<p:sld xmlns:a="http://schemas.openxmlformats.org/drawingml/2006/main" xmlns:r="http://schemas.openxmlformats.org/officeDocument/2006/relationships" xmlns:p="http://schemas.openxmlformats.org/presentationml/2006/main">
-  <p:cSld>
     <p:spTree>
       <p:nvGrpSpPr>
         <p:cNvPr id="1" name=""/>
@@ -3292,7 +3164,7 @@
         </p:blipFill>
         <p:spPr>
           <a:xfrm>
-            <a:off x="3794774" y="91863"/>
+            <a:off x="3854887" y="91863"/>
             <a:ext cx="5044425" cy="829922"/>
           </a:xfrm>
           <a:prstGeom prst="rect">
@@ -3516,7 +3388,7 @@
         </p:blipFill>
         <p:spPr>
           <a:xfrm>
-            <a:off x="373496" y="166745"/>
+            <a:off x="304800" y="166745"/>
             <a:ext cx="3476696" cy="755040"/>
           </a:xfrm>
           <a:prstGeom prst="rect">
@@ -3550,18 +3422,34 @@
           <a:p>
             <a:pPr algn="ctr"/>
             <a:r>
-              <a:rPr lang="en-US" sz="2400" dirty="0" smtClean="0"/>
+              <a:rPr lang="en-US" sz="2400" dirty="0" smtClean="0">
+                <a:solidFill>
+                  <a:srgbClr val="1C2939"/>
+                </a:solidFill>
+              </a:rPr>
               <a:t>Leveraging Communities to Highlight </a:t>
             </a:r>
             <a:r>
-              <a:rPr lang="en-US" sz="2400" dirty="0" smtClean="0"/>
+              <a:rPr lang="en-US" sz="2400" dirty="0" smtClean="0">
+                <a:solidFill>
+                  <a:srgbClr val="1C2939"/>
+                </a:solidFill>
+              </a:rPr>
               <a:t>Scholarly </a:t>
             </a:r>
             <a:r>
-              <a:rPr lang="en-US" sz="2400" dirty="0" smtClean="0"/>
+              <a:rPr lang="en-US" sz="2400" dirty="0" smtClean="0">
+                <a:solidFill>
+                  <a:srgbClr val="1C2939"/>
+                </a:solidFill>
+              </a:rPr>
               <a:t>Content</a:t>
             </a:r>
-            <a:endParaRPr lang="en-US" sz="2400" dirty="0"/>
+            <a:endParaRPr lang="en-US" sz="2400" dirty="0">
+              <a:solidFill>
+                <a:srgbClr val="1C2939"/>
+              </a:solidFill>
+            </a:endParaRPr>
           </a:p>
         </p:txBody>
       </p:sp>
@@ -3608,8 +3496,8 @@
         </p:nvSpPr>
         <p:spPr>
           <a:xfrm>
-            <a:off x="799561" y="1756151"/>
-            <a:ext cx="7431215" cy="307777"/>
+            <a:off x="799561" y="1602262"/>
+            <a:ext cx="7431215" cy="646331"/>
           </a:xfrm>
           <a:prstGeom prst="rect">
             <a:avLst/>
@@ -3623,34 +3511,103 @@
           <a:lstStyle/>
           <a:p>
             <a:r>
-              <a:rPr lang="en-US" sz="1400" dirty="0" smtClean="0"/>
+              <a:rPr lang="en-US" sz="1200" dirty="0" smtClean="0">
+                <a:solidFill>
+                  <a:srgbClr val="1C2939"/>
+                </a:solidFill>
+              </a:rPr>
               <a:t>Text text text text </a:t>
             </a:r>
             <a:r>
-              <a:rPr lang="en-US" sz="1400" dirty="0"/>
+              <a:rPr lang="en-US" sz="1200" dirty="0">
+                <a:solidFill>
+                  <a:srgbClr val="1C2939"/>
+                </a:solidFill>
+              </a:rPr>
               <a:t>Text text text </a:t>
             </a:r>
             <a:r>
-              <a:rPr lang="en-US" sz="1400" dirty="0" smtClean="0"/>
+              <a:rPr lang="en-US" sz="1200" dirty="0" smtClean="0">
+                <a:solidFill>
+                  <a:srgbClr val="1C2939"/>
+                </a:solidFill>
+              </a:rPr>
               <a:t>text </a:t>
             </a:r>
             <a:r>
-              <a:rPr lang="en-US" sz="1400" dirty="0"/>
+              <a:rPr lang="en-US" sz="1200" dirty="0">
+                <a:solidFill>
+                  <a:srgbClr val="1C2939"/>
+                </a:solidFill>
+              </a:rPr>
               <a:t>Text text text </a:t>
             </a:r>
             <a:r>
-              <a:rPr lang="en-US" sz="1400" dirty="0" smtClean="0"/>
+              <a:rPr lang="en-US" sz="1200" dirty="0" smtClean="0">
+                <a:solidFill>
+                  <a:srgbClr val="1C2939"/>
+                </a:solidFill>
+              </a:rPr>
               <a:t>text </a:t>
             </a:r>
             <a:r>
-              <a:rPr lang="en-US" sz="1400" dirty="0"/>
+              <a:rPr lang="en-US" sz="1200" dirty="0">
+                <a:solidFill>
+                  <a:srgbClr val="1C2939"/>
+                </a:solidFill>
+              </a:rPr>
               <a:t>Text text text text Text text text text </a:t>
             </a:r>
             <a:r>
-              <a:rPr lang="en-US" sz="1400" dirty="0" smtClean="0"/>
-              <a:t>Text</a:t>
-            </a:r>
-            <a:endParaRPr lang="en-US" sz="1400" dirty="0"/>
+              <a:rPr lang="en-US" sz="1200" dirty="0" smtClean="0">
+                <a:solidFill>
+                  <a:srgbClr val="1C2939"/>
+                </a:solidFill>
+              </a:rPr>
+              <a:t>Text </a:t>
+            </a:r>
+            <a:r>
+              <a:rPr lang="en-US" sz="1200" dirty="0">
+                <a:solidFill>
+                  <a:srgbClr val="1C2939"/>
+                </a:solidFill>
+              </a:rPr>
+              <a:t>Text text text text Text text text text Text text text text Text text text text Text text text text </a:t>
+            </a:r>
+            <a:r>
+              <a:rPr lang="en-US" sz="1200" dirty="0" smtClean="0">
+                <a:solidFill>
+                  <a:srgbClr val="1C2939"/>
+                </a:solidFill>
+              </a:rPr>
+              <a:t>Text </a:t>
+            </a:r>
+            <a:r>
+              <a:rPr lang="en-US" sz="1200" dirty="0">
+                <a:solidFill>
+                  <a:srgbClr val="1C2939"/>
+                </a:solidFill>
+              </a:rPr>
+              <a:t> text text text Text Text text text text </a:t>
+            </a:r>
+          </a:p>
+          <a:p>
+            <a:r>
+              <a:rPr lang="en-US" sz="1200" dirty="0" smtClean="0">
+                <a:solidFill>
+                  <a:srgbClr val="1C2939"/>
+                </a:solidFill>
+              </a:rPr>
+              <a:t>Text text text text Text text text text Text text text text Text text text text Text text text text Text </a:t>
+            </a:r>
+            <a:r>
+              <a:rPr lang="en-US" sz="1200" dirty="0">
+                <a:solidFill>
+                  <a:srgbClr val="1C2939"/>
+                </a:solidFill>
+              </a:rPr>
+              <a:t> Text text text text </a:t>
+            </a:r>
           </a:p>
         </p:txBody>
       </p:sp>
@@ -3676,7 +3633,7 @@
         </p:blipFill>
         <p:spPr>
           <a:xfrm>
-            <a:off x="799561" y="2320626"/>
+            <a:off x="486008" y="2063927"/>
             <a:ext cx="2937739" cy="1683601"/>
           </a:xfrm>
           <a:prstGeom prst="rect">
@@ -3684,10 +3641,695 @@
           </a:prstGeom>
         </p:spPr>
       </p:pic>
+      <p:cxnSp>
+        <p:nvCxnSpPr>
+          <p:cNvPr id="21" name="Straight Connector 20"/>
+          <p:cNvCxnSpPr/>
+          <p:nvPr/>
+        </p:nvCxnSpPr>
+        <p:spPr>
+          <a:xfrm>
+            <a:off x="101600" y="1602262"/>
+            <a:ext cx="8860423" cy="0"/>
+          </a:xfrm>
+          <a:prstGeom prst="line">
+            <a:avLst/>
+          </a:prstGeom>
+          <a:ln w="76200" cmpd="sng">
+            <a:solidFill>
+              <a:srgbClr val="E8EEED"/>
+            </a:solidFill>
+          </a:ln>
+          <a:effectLst/>
+        </p:spPr>
+        <p:style>
+          <a:lnRef idx="2">
+            <a:schemeClr val="accent1"/>
+          </a:lnRef>
+          <a:fillRef idx="0">
+            <a:schemeClr val="accent1"/>
+          </a:fillRef>
+          <a:effectRef idx="1">
+            <a:schemeClr val="accent1"/>
+          </a:effectRef>
+          <a:fontRef idx="minor">
+            <a:schemeClr val="tx1"/>
+          </a:fontRef>
+        </p:style>
+      </p:cxnSp>
     </p:spTree>
     <p:extLst>
       <p:ext uri="{BB962C8B-B14F-4D97-AF65-F5344CB8AC3E}">
         <p14:creationId xmlns:p14="http://schemas.microsoft.com/office/powerpoint/2010/main" val="1116421809"/>
+      </p:ext>
+    </p:extLst>
+  </p:cSld>
+  <p:clrMapOvr>
+    <a:masterClrMapping/>
+  </p:clrMapOvr>
+  <p:timing>
+    <p:tnLst>
+      <p:par>
+        <p:cTn xmlns:p14="http://schemas.microsoft.com/office/powerpoint/2010/main" id="1" dur="indefinite" restart="never" nodeType="tmRoot"/>
+      </p:par>
+    </p:tnLst>
+  </p:timing>
+</p:sld>
+</file>
+
+<file path=ppt/slides/slide2.xml><?xml version="1.0" encoding="utf-8"?>
+<p:sld xmlns:a="http://schemas.openxmlformats.org/drawingml/2006/main" xmlns:r="http://schemas.openxmlformats.org/officeDocument/2006/relationships" xmlns:p="http://schemas.openxmlformats.org/presentationml/2006/main">
+  <p:cSld>
+    <p:spTree>
+      <p:nvGrpSpPr>
+        <p:cNvPr id="1" name=""/>
+        <p:cNvGrpSpPr/>
+        <p:nvPr/>
+      </p:nvGrpSpPr>
+      <p:grpSpPr>
+        <a:xfrm>
+          <a:off x="0" y="0"/>
+          <a:ext cx="0" cy="0"/>
+          <a:chOff x="0" y="0"/>
+          <a:chExt cx="0" cy="0"/>
+        </a:xfrm>
+      </p:grpSpPr>
+      <p:sp>
+        <p:nvSpPr>
+          <p:cNvPr id="2" name="Rectangle 1"/>
+          <p:cNvSpPr/>
+          <p:nvPr/>
+        </p:nvSpPr>
+        <p:spPr>
+          <a:xfrm>
+            <a:off x="0" y="0"/>
+            <a:ext cx="9144000" cy="1417833"/>
+          </a:xfrm>
+          <a:prstGeom prst="rect">
+            <a:avLst/>
+          </a:prstGeom>
+          <a:solidFill>
+            <a:srgbClr val="E8EDEE"/>
+          </a:solidFill>
+          <a:ln>
+            <a:noFill/>
+          </a:ln>
+          <a:effectLst/>
+        </p:spPr>
+        <p:style>
+          <a:lnRef idx="1">
+            <a:schemeClr val="accent1"/>
+          </a:lnRef>
+          <a:fillRef idx="3">
+            <a:schemeClr val="accent1"/>
+          </a:fillRef>
+          <a:effectRef idx="2">
+            <a:schemeClr val="accent1"/>
+          </a:effectRef>
+          <a:fontRef idx="minor">
+            <a:schemeClr val="lt1"/>
+          </a:fontRef>
+        </p:style>
+        <p:txBody>
+          <a:bodyPr rtlCol="0" anchor="ctr"/>
+          <a:lstStyle/>
+          <a:p>
+            <a:pPr algn="ctr"/>
+            <a:endParaRPr lang="en-US"/>
+          </a:p>
+        </p:txBody>
+      </p:sp>
+      <p:pic>
+        <p:nvPicPr>
+          <p:cNvPr id="8" name="Picture 7" descr="DRS front page hero.png"/>
+          <p:cNvPicPr>
+            <a:picLocks noChangeAspect="1"/>
+          </p:cNvPicPr>
+          <p:nvPr/>
+        </p:nvPicPr>
+        <p:blipFill>
+          <a:blip r:embed="rId2">
+            <a:extLst>
+              <a:ext uri="{28A0092B-C50C-407E-A947-70E740481C1C}">
+                <a14:useLocalDpi xmlns:a14="http://schemas.microsoft.com/office/drawing/2010/main" val="0"/>
+              </a:ext>
+            </a:extLst>
+          </a:blip>
+          <a:stretch>
+            <a:fillRect/>
+          </a:stretch>
+        </p:blipFill>
+        <p:spPr>
+          <a:xfrm>
+            <a:off x="315262" y="696291"/>
+            <a:ext cx="3158276" cy="519608"/>
+          </a:xfrm>
+          <a:prstGeom prst="rect">
+            <a:avLst/>
+          </a:prstGeom>
+        </p:spPr>
+      </p:pic>
+      <p:sp>
+        <p:nvSpPr>
+          <p:cNvPr id="10" name="Rectangle 9"/>
+          <p:cNvSpPr/>
+          <p:nvPr/>
+        </p:nvSpPr>
+        <p:spPr>
+          <a:xfrm>
+            <a:off x="0" y="3"/>
+            <a:ext cx="304800" cy="6857997"/>
+          </a:xfrm>
+          <a:prstGeom prst="rect">
+            <a:avLst/>
+          </a:prstGeom>
+          <a:solidFill>
+            <a:srgbClr val="E8EDEE"/>
+          </a:solidFill>
+          <a:ln>
+            <a:noFill/>
+          </a:ln>
+          <a:effectLst/>
+        </p:spPr>
+        <p:style>
+          <a:lnRef idx="1">
+            <a:schemeClr val="accent1"/>
+          </a:lnRef>
+          <a:fillRef idx="3">
+            <a:schemeClr val="accent1"/>
+          </a:fillRef>
+          <a:effectRef idx="2">
+            <a:schemeClr val="accent1"/>
+          </a:effectRef>
+          <a:fontRef idx="minor">
+            <a:schemeClr val="lt1"/>
+          </a:fontRef>
+        </p:style>
+        <p:txBody>
+          <a:bodyPr rtlCol="0" anchor="ctr"/>
+          <a:lstStyle/>
+          <a:p>
+            <a:pPr algn="ctr"/>
+            <a:endParaRPr lang="en-US"/>
+          </a:p>
+        </p:txBody>
+      </p:sp>
+      <p:sp>
+        <p:nvSpPr>
+          <p:cNvPr id="13" name="Rectangle 12"/>
+          <p:cNvSpPr/>
+          <p:nvPr/>
+        </p:nvSpPr>
+        <p:spPr>
+          <a:xfrm>
+            <a:off x="8839200" y="3"/>
+            <a:ext cx="304800" cy="6857997"/>
+          </a:xfrm>
+          <a:prstGeom prst="rect">
+            <a:avLst/>
+          </a:prstGeom>
+          <a:solidFill>
+            <a:srgbClr val="E8EDEE"/>
+          </a:solidFill>
+          <a:ln>
+            <a:noFill/>
+          </a:ln>
+          <a:effectLst/>
+        </p:spPr>
+        <p:style>
+          <a:lnRef idx="1">
+            <a:schemeClr val="accent1"/>
+          </a:lnRef>
+          <a:fillRef idx="3">
+            <a:schemeClr val="accent1"/>
+          </a:fillRef>
+          <a:effectRef idx="2">
+            <a:schemeClr val="accent1"/>
+          </a:effectRef>
+          <a:fontRef idx="minor">
+            <a:schemeClr val="lt1"/>
+          </a:fontRef>
+        </p:style>
+        <p:txBody>
+          <a:bodyPr rtlCol="0" anchor="ctr"/>
+          <a:lstStyle/>
+          <a:p>
+            <a:pPr algn="ctr"/>
+            <a:endParaRPr lang="en-US"/>
+          </a:p>
+        </p:txBody>
+      </p:sp>
+      <p:sp>
+        <p:nvSpPr>
+          <p:cNvPr id="14" name="Rectangle 13"/>
+          <p:cNvSpPr/>
+          <p:nvPr/>
+        </p:nvSpPr>
+        <p:spPr>
+          <a:xfrm rot="5400000">
+            <a:off x="4228583" y="2124561"/>
+            <a:ext cx="504856" cy="8962023"/>
+          </a:xfrm>
+          <a:prstGeom prst="rect">
+            <a:avLst/>
+          </a:prstGeom>
+          <a:solidFill>
+            <a:srgbClr val="E8EDEE"/>
+          </a:solidFill>
+          <a:ln>
+            <a:noFill/>
+          </a:ln>
+          <a:effectLst/>
+        </p:spPr>
+        <p:style>
+          <a:lnRef idx="1">
+            <a:schemeClr val="accent1"/>
+          </a:lnRef>
+          <a:fillRef idx="3">
+            <a:schemeClr val="accent1"/>
+          </a:fillRef>
+          <a:effectRef idx="2">
+            <a:schemeClr val="accent1"/>
+          </a:effectRef>
+          <a:fontRef idx="minor">
+            <a:schemeClr val="lt1"/>
+          </a:fontRef>
+        </p:style>
+        <p:txBody>
+          <a:bodyPr rtlCol="0" anchor="ctr"/>
+          <a:lstStyle/>
+          <a:p>
+            <a:pPr algn="ctr"/>
+            <a:endParaRPr lang="en-US"/>
+          </a:p>
+        </p:txBody>
+      </p:sp>
+      <p:sp>
+        <p:nvSpPr>
+          <p:cNvPr id="18" name="TextBox 17"/>
+          <p:cNvSpPr txBox="1"/>
+          <p:nvPr/>
+        </p:nvSpPr>
+        <p:spPr>
+          <a:xfrm>
+            <a:off x="1573752" y="6353145"/>
+            <a:ext cx="5901492" cy="400110"/>
+          </a:xfrm>
+          <a:prstGeom prst="rect">
+            <a:avLst/>
+          </a:prstGeom>
+          <a:noFill/>
+        </p:spPr>
+        <p:txBody>
+          <a:bodyPr wrap="square" rtlCol="0">
+            <a:spAutoFit/>
+          </a:bodyPr>
+          <a:lstStyle/>
+          <a:p>
+            <a:pPr algn="ctr"/>
+            <a:r>
+              <a:rPr lang="en-US" sz="2000" dirty="0">
+                <a:solidFill>
+                  <a:schemeClr val="accent1">
+                    <a:lumMod val="75000"/>
+                  </a:schemeClr>
+                </a:solidFill>
+                <a:latin typeface="Calibri (Body)"/>
+                <a:cs typeface="Calibri (Body)"/>
+              </a:rPr>
+              <a:t>https://</a:t>
+            </a:r>
+            <a:r>
+              <a:rPr lang="en-US" sz="2000" dirty="0" err="1" smtClean="0">
+                <a:solidFill>
+                  <a:schemeClr val="accent1">
+                    <a:lumMod val="75000"/>
+                  </a:schemeClr>
+                </a:solidFill>
+                <a:latin typeface="Calibri (Body)"/>
+                <a:cs typeface="Calibri (Body)"/>
+              </a:rPr>
+              <a:t>repository.library.northeastern.edu</a:t>
+            </a:r>
+            <a:endParaRPr lang="en-US" sz="2000" dirty="0">
+              <a:solidFill>
+                <a:schemeClr val="accent1">
+                  <a:lumMod val="75000"/>
+                </a:schemeClr>
+              </a:solidFill>
+              <a:latin typeface="Calibri (Body)"/>
+              <a:cs typeface="Calibri (Body)"/>
+            </a:endParaRPr>
+          </a:p>
+        </p:txBody>
+      </p:sp>
+      <p:pic>
+        <p:nvPicPr>
+          <p:cNvPr id="5" name="Picture 4" descr="2014-10-30_1045.png"/>
+          <p:cNvPicPr>
+            <a:picLocks noChangeAspect="1"/>
+          </p:cNvPicPr>
+          <p:nvPr/>
+        </p:nvPicPr>
+        <p:blipFill>
+          <a:blip r:embed="rId3">
+            <a:extLst>
+              <a:ext uri="{28A0092B-C50C-407E-A947-70E740481C1C}">
+                <a14:useLocalDpi xmlns:a14="http://schemas.microsoft.com/office/drawing/2010/main" val="0"/>
+              </a:ext>
+            </a:extLst>
+          </a:blip>
+          <a:stretch>
+            <a:fillRect/>
+          </a:stretch>
+        </p:blipFill>
+        <p:spPr>
+          <a:xfrm>
+            <a:off x="315261" y="186787"/>
+            <a:ext cx="2388865" cy="518794"/>
+          </a:xfrm>
+          <a:prstGeom prst="rect">
+            <a:avLst/>
+          </a:prstGeom>
+        </p:spPr>
+      </p:pic>
+      <p:sp>
+        <p:nvSpPr>
+          <p:cNvPr id="16" name="TextBox 15"/>
+          <p:cNvSpPr txBox="1"/>
+          <p:nvPr/>
+        </p:nvSpPr>
+        <p:spPr>
+          <a:xfrm>
+            <a:off x="2704126" y="188922"/>
+            <a:ext cx="6135072" cy="830997"/>
+          </a:xfrm>
+          <a:prstGeom prst="rect">
+            <a:avLst/>
+          </a:prstGeom>
+          <a:solidFill>
+            <a:schemeClr val="bg1"/>
+          </a:solidFill>
+        </p:spPr>
+        <p:txBody>
+          <a:bodyPr wrap="square" rtlCol="0" anchor="ctr">
+            <a:spAutoFit/>
+          </a:bodyPr>
+          <a:lstStyle/>
+          <a:p>
+            <a:pPr algn="ctr"/>
+            <a:r>
+              <a:rPr lang="en-US" sz="2400" dirty="0" smtClean="0">
+                <a:solidFill>
+                  <a:srgbClr val="1C2939"/>
+                </a:solidFill>
+              </a:rPr>
+              <a:t>Using Communities to Highlight </a:t>
+            </a:r>
+            <a:r>
+              <a:rPr lang="en-US" sz="2400" dirty="0" smtClean="0">
+                <a:solidFill>
+                  <a:srgbClr val="1C2939"/>
+                </a:solidFill>
+              </a:rPr>
+              <a:t>Scholarly </a:t>
+            </a:r>
+            <a:r>
+              <a:rPr lang="en-US" sz="2400" dirty="0" smtClean="0">
+                <a:solidFill>
+                  <a:srgbClr val="1C2939"/>
+                </a:solidFill>
+              </a:rPr>
+              <a:t>Content</a:t>
+            </a:r>
+            <a:endParaRPr lang="en-US" sz="2400" dirty="0">
+              <a:solidFill>
+                <a:srgbClr val="1C2939"/>
+              </a:solidFill>
+            </a:endParaRPr>
+          </a:p>
+        </p:txBody>
+      </p:sp>
+      <p:pic>
+        <p:nvPicPr>
+          <p:cNvPr id="11" name="Picture 10" descr="SmartCollections3.jpg"/>
+          <p:cNvPicPr>
+            <a:picLocks noChangeAspect="1"/>
+          </p:cNvPicPr>
+          <p:nvPr/>
+        </p:nvPicPr>
+        <p:blipFill>
+          <a:blip r:embed="rId4">
+            <a:extLst>
+              <a:ext uri="{28A0092B-C50C-407E-A947-70E740481C1C}">
+                <a14:useLocalDpi xmlns:a14="http://schemas.microsoft.com/office/drawing/2010/main" val="0"/>
+              </a:ext>
+            </a:extLst>
+          </a:blip>
+          <a:stretch>
+            <a:fillRect/>
+          </a:stretch>
+        </p:blipFill>
+        <p:spPr>
+          <a:xfrm>
+            <a:off x="7275755" y="1706386"/>
+            <a:ext cx="1563444" cy="2658693"/>
+          </a:xfrm>
+          <a:prstGeom prst="rect">
+            <a:avLst/>
+          </a:prstGeom>
+          <a:ln>
+            <a:solidFill>
+              <a:srgbClr val="FF0000"/>
+            </a:solidFill>
+          </a:ln>
+        </p:spPr>
+      </p:pic>
+      <p:sp>
+        <p:nvSpPr>
+          <p:cNvPr id="12" name="TextBox 11"/>
+          <p:cNvSpPr txBox="1"/>
+          <p:nvPr/>
+        </p:nvSpPr>
+        <p:spPr>
+          <a:xfrm>
+            <a:off x="799561" y="1602262"/>
+            <a:ext cx="7431215" cy="646331"/>
+          </a:xfrm>
+          <a:prstGeom prst="rect">
+            <a:avLst/>
+          </a:prstGeom>
+          <a:noFill/>
+        </p:spPr>
+        <p:txBody>
+          <a:bodyPr wrap="square" rtlCol="0">
+            <a:spAutoFit/>
+          </a:bodyPr>
+          <a:lstStyle/>
+          <a:p>
+            <a:r>
+              <a:rPr lang="en-US" sz="1200" dirty="0" smtClean="0">
+                <a:solidFill>
+                  <a:srgbClr val="1C2939"/>
+                </a:solidFill>
+              </a:rPr>
+              <a:t>Text text text text </a:t>
+            </a:r>
+            <a:r>
+              <a:rPr lang="en-US" sz="1200" dirty="0">
+                <a:solidFill>
+                  <a:srgbClr val="1C2939"/>
+                </a:solidFill>
+              </a:rPr>
+              <a:t>Text text text </a:t>
+            </a:r>
+            <a:r>
+              <a:rPr lang="en-US" sz="1200" dirty="0" smtClean="0">
+                <a:solidFill>
+                  <a:srgbClr val="1C2939"/>
+                </a:solidFill>
+              </a:rPr>
+              <a:t>text </a:t>
+            </a:r>
+            <a:r>
+              <a:rPr lang="en-US" sz="1200" dirty="0">
+                <a:solidFill>
+                  <a:srgbClr val="1C2939"/>
+                </a:solidFill>
+              </a:rPr>
+              <a:t>Text text text </a:t>
+            </a:r>
+            <a:r>
+              <a:rPr lang="en-US" sz="1200" dirty="0" smtClean="0">
+                <a:solidFill>
+                  <a:srgbClr val="1C2939"/>
+                </a:solidFill>
+              </a:rPr>
+              <a:t>text </a:t>
+            </a:r>
+            <a:r>
+              <a:rPr lang="en-US" sz="1200" dirty="0">
+                <a:solidFill>
+                  <a:srgbClr val="1C2939"/>
+                </a:solidFill>
+              </a:rPr>
+              <a:t>Text text text text Text text text text </a:t>
+            </a:r>
+            <a:r>
+              <a:rPr lang="en-US" sz="1200" dirty="0" smtClean="0">
+                <a:solidFill>
+                  <a:srgbClr val="1C2939"/>
+                </a:solidFill>
+              </a:rPr>
+              <a:t>Text </a:t>
+            </a:r>
+            <a:r>
+              <a:rPr lang="en-US" sz="1200" dirty="0">
+                <a:solidFill>
+                  <a:srgbClr val="1C2939"/>
+                </a:solidFill>
+              </a:rPr>
+              <a:t>Text text text text Text text text text Text text text text Text text text text Text text text text </a:t>
+            </a:r>
+            <a:r>
+              <a:rPr lang="en-US" sz="1200" dirty="0" smtClean="0">
+                <a:solidFill>
+                  <a:srgbClr val="1C2939"/>
+                </a:solidFill>
+              </a:rPr>
+              <a:t>Text </a:t>
+            </a:r>
+            <a:r>
+              <a:rPr lang="en-US" sz="1200" dirty="0">
+                <a:solidFill>
+                  <a:srgbClr val="1C2939"/>
+                </a:solidFill>
+              </a:rPr>
+              <a:t> text text text Text Text text text text </a:t>
+            </a:r>
+          </a:p>
+          <a:p>
+            <a:r>
+              <a:rPr lang="en-US" sz="1200" dirty="0" smtClean="0">
+                <a:solidFill>
+                  <a:srgbClr val="1C2939"/>
+                </a:solidFill>
+              </a:rPr>
+              <a:t>Text text text text Text text text text Text text text text Text text text text Text text text text Text </a:t>
+            </a:r>
+            <a:r>
+              <a:rPr lang="en-US" sz="1200" dirty="0">
+                <a:solidFill>
+                  <a:srgbClr val="1C2939"/>
+                </a:solidFill>
+              </a:rPr>
+              <a:t> Text text text text </a:t>
+            </a:r>
+          </a:p>
+        </p:txBody>
+      </p:sp>
+      <p:pic>
+        <p:nvPicPr>
+          <p:cNvPr id="19" name="Picture 18" descr="2014-10-30_1012.png"/>
+          <p:cNvPicPr>
+            <a:picLocks noChangeAspect="1"/>
+          </p:cNvPicPr>
+          <p:nvPr/>
+        </p:nvPicPr>
+        <p:blipFill>
+          <a:blip r:embed="rId5">
+            <a:extLst>
+              <a:ext uri="{28A0092B-C50C-407E-A947-70E740481C1C}">
+                <a14:useLocalDpi xmlns:a14="http://schemas.microsoft.com/office/drawing/2010/main" val="0"/>
+              </a:ext>
+            </a:extLst>
+          </a:blip>
+          <a:stretch>
+            <a:fillRect/>
+          </a:stretch>
+        </p:blipFill>
+        <p:spPr>
+          <a:xfrm>
+            <a:off x="2704127" y="2766410"/>
+            <a:ext cx="3519907" cy="2017238"/>
+          </a:xfrm>
+          <a:prstGeom prst="rect">
+            <a:avLst/>
+          </a:prstGeom>
+        </p:spPr>
+      </p:pic>
+      <p:sp>
+        <p:nvSpPr>
+          <p:cNvPr id="3" name="TextBox 2"/>
+          <p:cNvSpPr txBox="1"/>
+          <p:nvPr/>
+        </p:nvSpPr>
+        <p:spPr>
+          <a:xfrm>
+            <a:off x="5050993" y="2248593"/>
+            <a:ext cx="2346082" cy="646331"/>
+          </a:xfrm>
+          <a:prstGeom prst="rect">
+            <a:avLst/>
+          </a:prstGeom>
+          <a:solidFill>
+            <a:srgbClr val="FFFFFF"/>
+          </a:solidFill>
+        </p:spPr>
+        <p:txBody>
+          <a:bodyPr wrap="square" rtlCol="0">
+            <a:spAutoFit/>
+          </a:bodyPr>
+          <a:lstStyle/>
+          <a:p>
+            <a:r>
+              <a:rPr lang="en-US" sz="1200" b="1" dirty="0" smtClean="0">
+                <a:solidFill>
+                  <a:srgbClr val="818181"/>
+                </a:solidFill>
+              </a:rPr>
+              <a:t>Sarah Sweeney</a:t>
+            </a:r>
+          </a:p>
+          <a:p>
+            <a:r>
+              <a:rPr lang="en-US" sz="1200" b="1" dirty="0" smtClean="0">
+                <a:solidFill>
+                  <a:srgbClr val="818181"/>
+                </a:solidFill>
+              </a:rPr>
+              <a:t>Digital Repository Manager</a:t>
+            </a:r>
+          </a:p>
+          <a:p>
+            <a:r>
+              <a:rPr lang="en-US" sz="1200" b="1" dirty="0" err="1">
+                <a:solidFill>
+                  <a:srgbClr val="818181"/>
+                </a:solidFill>
+              </a:rPr>
+              <a:t>s</a:t>
+            </a:r>
+            <a:r>
+              <a:rPr lang="en-US" sz="1200" b="1" dirty="0" err="1" smtClean="0">
+                <a:solidFill>
+                  <a:srgbClr val="818181"/>
+                </a:solidFill>
+              </a:rPr>
+              <a:t>j.sweeney@neu.edu</a:t>
+            </a:r>
+            <a:endParaRPr lang="en-US" sz="1200" b="1" dirty="0">
+              <a:solidFill>
+                <a:srgbClr val="818181"/>
+              </a:solidFill>
+            </a:endParaRPr>
+          </a:p>
+        </p:txBody>
+      </p:sp>
+    </p:spTree>
+    <p:extLst>
+      <p:ext uri="{BB962C8B-B14F-4D97-AF65-F5344CB8AC3E}">
+        <p14:creationId xmlns:p14="http://schemas.microsoft.com/office/powerpoint/2010/main" val="2625297081"/>
       </p:ext>
     </p:extLst>
   </p:cSld>
@@ -3723,14 +4365,14 @@
       </p:grpSpPr>
       <p:sp>
         <p:nvSpPr>
-          <p:cNvPr id="2" name="Rectangle 1"/>
+          <p:cNvPr id="14" name="Rectangle 13"/>
           <p:cNvSpPr/>
           <p:nvPr/>
         </p:nvSpPr>
         <p:spPr>
-          <a:xfrm>
-            <a:off x="0" y="0"/>
-            <a:ext cx="9144000" cy="993412"/>
+          <a:xfrm rot="5400000">
+            <a:off x="1142999" y="-1143000"/>
+            <a:ext cx="6858000" cy="9144000"/>
           </a:xfrm>
           <a:prstGeom prst="rect">
             <a:avLst/>
@@ -3762,56 +4404,29 @@
           <a:lstStyle/>
           <a:p>
             <a:pPr algn="ctr"/>
-            <a:endParaRPr lang="en-US"/>
-          </a:p>
-        </p:txBody>
-      </p:sp>
-      <p:pic>
-        <p:nvPicPr>
-          <p:cNvPr id="8" name="Picture 7" descr="DRS front page hero.png"/>
-          <p:cNvPicPr>
-            <a:picLocks noChangeAspect="1"/>
-          </p:cNvPicPr>
+            <a:endParaRPr lang="en-US">
+              <a:latin typeface="Helvetica"/>
+              <a:cs typeface="Helvetica"/>
+            </a:endParaRPr>
+          </a:p>
+        </p:txBody>
+      </p:sp>
+      <p:sp>
+        <p:nvSpPr>
+          <p:cNvPr id="33" name="Rectangle 32"/>
+          <p:cNvSpPr/>
           <p:nvPr/>
-        </p:nvPicPr>
-        <p:blipFill>
-          <a:blip r:embed="rId2">
-            <a:extLst>
-              <a:ext uri="{28A0092B-C50C-407E-A947-70E740481C1C}">
-                <a14:useLocalDpi xmlns:a14="http://schemas.microsoft.com/office/drawing/2010/main" val="0"/>
-              </a:ext>
-            </a:extLst>
-          </a:blip>
-          <a:stretch>
-            <a:fillRect/>
-          </a:stretch>
-        </p:blipFill>
+        </p:nvSpPr>
         <p:spPr>
           <a:xfrm>
-            <a:off x="1552935" y="3"/>
-            <a:ext cx="6038130" cy="993409"/>
-          </a:xfrm>
-          <a:prstGeom prst="rect">
-            <a:avLst/>
-          </a:prstGeom>
-        </p:spPr>
-      </p:pic>
-      <p:sp>
-        <p:nvSpPr>
-          <p:cNvPr id="10" name="Rectangle 9"/>
-          <p:cNvSpPr/>
-          <p:nvPr/>
-        </p:nvSpPr>
-        <p:spPr>
-          <a:xfrm>
-            <a:off x="0" y="3"/>
-            <a:ext cx="304800" cy="6857997"/>
+            <a:off x="208947" y="142755"/>
+            <a:ext cx="8710934" cy="754053"/>
           </a:xfrm>
           <a:prstGeom prst="rect">
             <a:avLst/>
           </a:prstGeom>
           <a:solidFill>
-            <a:srgbClr val="E8EDEE"/>
+            <a:schemeClr val="bg1"/>
           </a:solidFill>
           <a:ln>
             <a:noFill/>
@@ -3843,269 +4458,1865 @@
       </p:sp>
       <p:sp>
         <p:nvSpPr>
-          <p:cNvPr id="13" name="Rectangle 12"/>
-          <p:cNvSpPr/>
+          <p:cNvPr id="23" name="TextBox 22"/>
+          <p:cNvSpPr txBox="1"/>
           <p:nvPr/>
         </p:nvSpPr>
         <p:spPr>
           <a:xfrm>
-            <a:off x="8839200" y="3"/>
-            <a:ext cx="304800" cy="6857997"/>
+            <a:off x="208948" y="142755"/>
+            <a:ext cx="8710933" cy="461665"/>
           </a:xfrm>
           <a:prstGeom prst="rect">
             <a:avLst/>
           </a:prstGeom>
           <a:solidFill>
-            <a:srgbClr val="E8EDEE"/>
+            <a:schemeClr val="bg1"/>
           </a:solidFill>
-          <a:ln>
-            <a:noFill/>
-          </a:ln>
-          <a:effectLst/>
         </p:spPr>
-        <p:style>
-          <a:lnRef idx="1">
-            <a:schemeClr val="accent1"/>
-          </a:lnRef>
-          <a:fillRef idx="3">
-            <a:schemeClr val="accent1"/>
-          </a:fillRef>
-          <a:effectRef idx="2">
-            <a:schemeClr val="accent1"/>
-          </a:effectRef>
-          <a:fontRef idx="minor">
-            <a:schemeClr val="lt1"/>
-          </a:fontRef>
-        </p:style>
-        <p:txBody>
-          <a:bodyPr rtlCol="0" anchor="ctr"/>
+        <p:txBody>
+          <a:bodyPr wrap="square" rtlCol="0" anchor="ctr">
+            <a:spAutoFit/>
+          </a:bodyPr>
           <a:lstStyle/>
           <a:p>
-            <a:pPr algn="ctr"/>
-            <a:endParaRPr lang="en-US"/>
-          </a:p>
-        </p:txBody>
-      </p:sp>
-      <p:sp>
-        <p:nvSpPr>
-          <p:cNvPr id="14" name="Rectangle 13"/>
-          <p:cNvSpPr/>
+            <a:r>
+              <a:rPr lang="en-US" sz="2400" dirty="0" smtClean="0">
+                <a:solidFill>
+                  <a:srgbClr val="1C2939"/>
+                </a:solidFill>
+                <a:latin typeface="Helvetica"/>
+                <a:cs typeface="Helvetica"/>
+              </a:rPr>
+              <a:t>Using Communities to Highlight </a:t>
+            </a:r>
+            <a:r>
+              <a:rPr lang="en-US" sz="2400" dirty="0" smtClean="0">
+                <a:solidFill>
+                  <a:srgbClr val="1C2939"/>
+                </a:solidFill>
+                <a:latin typeface="Helvetica"/>
+                <a:cs typeface="Helvetica"/>
+              </a:rPr>
+              <a:t>Scholarly </a:t>
+            </a:r>
+            <a:r>
+              <a:rPr lang="en-US" sz="2400" dirty="0" smtClean="0">
+                <a:solidFill>
+                  <a:srgbClr val="1C2939"/>
+                </a:solidFill>
+                <a:latin typeface="Helvetica"/>
+                <a:cs typeface="Helvetica"/>
+              </a:rPr>
+              <a:t>Content</a:t>
+            </a:r>
+          </a:p>
+        </p:txBody>
+      </p:sp>
+      <p:sp>
+        <p:nvSpPr>
+          <p:cNvPr id="15" name="TextBox 14"/>
+          <p:cNvSpPr txBox="1"/>
           <p:nvPr/>
         </p:nvSpPr>
         <p:spPr>
-          <a:xfrm rot="5400000">
-            <a:off x="4328611" y="2224589"/>
-            <a:ext cx="304800" cy="8962023"/>
+          <a:xfrm>
+            <a:off x="208948" y="1130315"/>
+            <a:ext cx="2644588" cy="1117229"/>
           </a:xfrm>
           <a:prstGeom prst="rect">
             <a:avLst/>
           </a:prstGeom>
-          <a:solidFill>
-            <a:srgbClr val="E8EDEE"/>
-          </a:solidFill>
-          <a:ln>
-            <a:noFill/>
+          <a:noFill/>
+          <a:ln w="28575" cmpd="sng">
+            <a:solidFill>
+              <a:schemeClr val="tx1"/>
+            </a:solidFill>
           </a:ln>
-          <a:effectLst/>
         </p:spPr>
-        <p:style>
-          <a:lnRef idx="1">
-            <a:schemeClr val="accent1"/>
-          </a:lnRef>
-          <a:fillRef idx="3">
-            <a:schemeClr val="accent1"/>
-          </a:fillRef>
-          <a:effectRef idx="2">
-            <a:schemeClr val="accent1"/>
-          </a:effectRef>
-          <a:fontRef idx="minor">
-            <a:schemeClr val="lt1"/>
-          </a:fontRef>
-        </p:style>
-        <p:txBody>
-          <a:bodyPr rtlCol="0" anchor="ctr"/>
+        <p:txBody>
+          <a:bodyPr wrap="square" rtlCol="0">
+            <a:spAutoFit/>
+          </a:bodyPr>
           <a:lstStyle/>
           <a:p>
-            <a:pPr algn="ctr"/>
-            <a:endParaRPr lang="en-US"/>
-          </a:p>
-        </p:txBody>
-      </p:sp>
-      <p:sp>
-        <p:nvSpPr>
-          <p:cNvPr id="15" name="Title 10"/>
-          <p:cNvSpPr txBox="1">
-            <a:spLocks/>
-          </p:cNvSpPr>
+            <a:pPr>
+              <a:lnSpc>
+                <a:spcPct val="90000"/>
+              </a:lnSpc>
+            </a:pPr>
+            <a:r>
+              <a:rPr lang="en-US" sz="1400" b="1" dirty="0" smtClean="0">
+                <a:latin typeface="Helvetica"/>
+                <a:cs typeface="Helvetica"/>
+              </a:rPr>
+              <a:t>Introduction</a:t>
+            </a:r>
+          </a:p>
+          <a:p>
+            <a:pPr>
+              <a:lnSpc>
+                <a:spcPct val="110000"/>
+              </a:lnSpc>
+            </a:pPr>
+            <a:r>
+              <a:rPr lang="en-US" sz="1200" dirty="0" err="1" smtClean="0">
+                <a:latin typeface="Helvetica"/>
+                <a:cs typeface="Helvetica"/>
+              </a:rPr>
+              <a:t>Lorem</a:t>
+            </a:r>
+            <a:r>
+              <a:rPr lang="en-US" sz="1200" dirty="0" smtClean="0">
+                <a:latin typeface="Helvetica"/>
+                <a:cs typeface="Helvetica"/>
+              </a:rPr>
+              <a:t> </a:t>
+            </a:r>
+            <a:r>
+              <a:rPr lang="en-US" sz="1200" dirty="0" err="1">
+                <a:latin typeface="Helvetica"/>
+                <a:cs typeface="Helvetica"/>
+              </a:rPr>
+              <a:t>ipsum</a:t>
+            </a:r>
+            <a:r>
+              <a:rPr lang="en-US" sz="1200" dirty="0">
+                <a:latin typeface="Helvetica"/>
+                <a:cs typeface="Helvetica"/>
+              </a:rPr>
+              <a:t> dolor sit </a:t>
+            </a:r>
+            <a:r>
+              <a:rPr lang="en-US" sz="1200" dirty="0" err="1">
+                <a:latin typeface="Helvetica"/>
+                <a:cs typeface="Helvetica"/>
+              </a:rPr>
+              <a:t>amet</a:t>
+            </a:r>
+            <a:r>
+              <a:rPr lang="en-US" sz="1200" dirty="0">
+                <a:latin typeface="Helvetica"/>
+                <a:cs typeface="Helvetica"/>
+              </a:rPr>
+              <a:t>, </a:t>
+            </a:r>
+            <a:r>
+              <a:rPr lang="en-US" sz="1200" dirty="0" err="1">
+                <a:latin typeface="Helvetica"/>
+                <a:cs typeface="Helvetica"/>
+              </a:rPr>
+              <a:t>consectetur</a:t>
+            </a:r>
+            <a:r>
+              <a:rPr lang="en-US" sz="1200" dirty="0">
+                <a:latin typeface="Helvetica"/>
+                <a:cs typeface="Helvetica"/>
+              </a:rPr>
+              <a:t> </a:t>
+            </a:r>
+            <a:r>
+              <a:rPr lang="en-US" sz="1200" dirty="0" err="1">
+                <a:latin typeface="Helvetica"/>
+                <a:cs typeface="Helvetica"/>
+              </a:rPr>
+              <a:t>adipiscing</a:t>
+            </a:r>
+            <a:r>
+              <a:rPr lang="en-US" sz="1200" dirty="0">
+                <a:latin typeface="Helvetica"/>
+                <a:cs typeface="Helvetica"/>
+              </a:rPr>
+              <a:t> </a:t>
+            </a:r>
+            <a:r>
+              <a:rPr lang="en-US" sz="1200" dirty="0" err="1">
+                <a:latin typeface="Helvetica"/>
+                <a:cs typeface="Helvetica"/>
+              </a:rPr>
+              <a:t>elit</a:t>
+            </a:r>
+            <a:r>
+              <a:rPr lang="en-US" sz="1200" dirty="0">
+                <a:latin typeface="Helvetica"/>
+                <a:cs typeface="Helvetica"/>
+              </a:rPr>
+              <a:t>, </a:t>
+            </a:r>
+            <a:r>
+              <a:rPr lang="en-US" sz="1200" dirty="0" err="1">
+                <a:latin typeface="Helvetica"/>
+                <a:cs typeface="Helvetica"/>
+              </a:rPr>
+              <a:t>sed</a:t>
+            </a:r>
+            <a:r>
+              <a:rPr lang="en-US" sz="1200" dirty="0">
+                <a:latin typeface="Helvetica"/>
+                <a:cs typeface="Helvetica"/>
+              </a:rPr>
+              <a:t> do </a:t>
+            </a:r>
+            <a:r>
+              <a:rPr lang="en-US" sz="1200" dirty="0" err="1">
+                <a:latin typeface="Helvetica"/>
+                <a:cs typeface="Helvetica"/>
+              </a:rPr>
+              <a:t>eiusmod</a:t>
+            </a:r>
+            <a:r>
+              <a:rPr lang="en-US" sz="1200" dirty="0">
+                <a:latin typeface="Helvetica"/>
+                <a:cs typeface="Helvetica"/>
+              </a:rPr>
+              <a:t> </a:t>
+            </a:r>
+            <a:r>
+              <a:rPr lang="en-US" sz="1200" dirty="0" err="1">
+                <a:latin typeface="Helvetica"/>
+                <a:cs typeface="Helvetica"/>
+              </a:rPr>
+              <a:t>tempor</a:t>
+            </a:r>
+            <a:r>
+              <a:rPr lang="en-US" sz="1200" dirty="0">
+                <a:latin typeface="Helvetica"/>
+                <a:cs typeface="Helvetica"/>
+              </a:rPr>
+              <a:t> </a:t>
+            </a:r>
+            <a:r>
+              <a:rPr lang="en-US" sz="1200" dirty="0" err="1">
+                <a:latin typeface="Helvetica"/>
+                <a:cs typeface="Helvetica"/>
+              </a:rPr>
+              <a:t>incididunt</a:t>
+            </a:r>
+            <a:r>
+              <a:rPr lang="en-US" sz="1200" dirty="0">
+                <a:latin typeface="Helvetica"/>
+                <a:cs typeface="Helvetica"/>
+              </a:rPr>
+              <a:t> </a:t>
+            </a:r>
+            <a:r>
+              <a:rPr lang="en-US" sz="1200" dirty="0" err="1">
+                <a:latin typeface="Helvetica"/>
+                <a:cs typeface="Helvetica"/>
+              </a:rPr>
+              <a:t>ut</a:t>
+            </a:r>
+            <a:r>
+              <a:rPr lang="en-US" sz="1200" dirty="0">
+                <a:latin typeface="Helvetica"/>
+                <a:cs typeface="Helvetica"/>
+              </a:rPr>
+              <a:t> </a:t>
+            </a:r>
+            <a:r>
+              <a:rPr lang="en-US" sz="1200" dirty="0" err="1">
+                <a:latin typeface="Helvetica"/>
+                <a:cs typeface="Helvetica"/>
+              </a:rPr>
+              <a:t>labore</a:t>
+            </a:r>
+            <a:r>
+              <a:rPr lang="en-US" sz="1200" dirty="0">
+                <a:latin typeface="Helvetica"/>
+                <a:cs typeface="Helvetica"/>
+              </a:rPr>
+              <a:t> et </a:t>
+            </a:r>
+            <a:r>
+              <a:rPr lang="en-US" sz="1200" dirty="0" err="1">
+                <a:latin typeface="Helvetica"/>
+                <a:cs typeface="Helvetica"/>
+              </a:rPr>
+              <a:t>dolore</a:t>
+            </a:r>
+            <a:r>
+              <a:rPr lang="en-US" sz="1200" dirty="0">
+                <a:latin typeface="Helvetica"/>
+                <a:cs typeface="Helvetica"/>
+              </a:rPr>
+              <a:t> magna </a:t>
+            </a:r>
+            <a:r>
+              <a:rPr lang="en-US" sz="1200" dirty="0" err="1">
+                <a:latin typeface="Helvetica"/>
+                <a:cs typeface="Helvetica"/>
+              </a:rPr>
+              <a:t>aliqua</a:t>
+            </a:r>
+            <a:r>
+              <a:rPr lang="en-US" sz="1200" dirty="0">
+                <a:latin typeface="Helvetica"/>
+                <a:cs typeface="Helvetica"/>
+              </a:rPr>
+              <a:t>. </a:t>
+            </a:r>
+          </a:p>
+        </p:txBody>
+      </p:sp>
+      <p:sp>
+        <p:nvSpPr>
+          <p:cNvPr id="24" name="TextBox 23"/>
+          <p:cNvSpPr txBox="1"/>
           <p:nvPr/>
         </p:nvSpPr>
         <p:spPr>
           <a:xfrm>
-            <a:off x="457200" y="1217584"/>
-            <a:ext cx="8229600" cy="1143000"/>
+            <a:off x="3055334" y="1130315"/>
+            <a:ext cx="2913529" cy="2111347"/>
           </a:xfrm>
           <a:prstGeom prst="rect">
             <a:avLst/>
           </a:prstGeom>
+          <a:noFill/>
+          <a:ln w="28575" cmpd="sng">
+            <a:solidFill>
+              <a:schemeClr val="tx1"/>
+            </a:solidFill>
+          </a:ln>
         </p:spPr>
         <p:txBody>
-          <a:bodyPr vert="horz" lIns="91440" tIns="45720" rIns="91440" bIns="45720" rtlCol="0" anchor="ctr">
-            <a:normAutofit/>
+          <a:bodyPr wrap="square" rtlCol="0">
+            <a:spAutoFit/>
           </a:bodyPr>
-          <a:lstStyle>
-            <a:lvl1pPr algn="ctr" defTabSz="457200" rtl="0" eaLnBrk="1" latinLnBrk="0" hangingPunct="1">
-              <a:spcBef>
-                <a:spcPct val="0"/>
-              </a:spcBef>
-              <a:buNone/>
-              <a:defRPr sz="4400" kern="1200">
-                <a:solidFill>
-                  <a:schemeClr val="tx1"/>
-                </a:solidFill>
-                <a:latin typeface="+mj-lt"/>
-                <a:ea typeface="+mj-ea"/>
-                <a:cs typeface="+mj-cs"/>
-              </a:defRPr>
-            </a:lvl1pPr>
-          </a:lstStyle>
-          <a:p>
-            <a:r>
-              <a:rPr lang="en-US" dirty="0" smtClean="0">
-                <a:solidFill>
-                  <a:srgbClr val="202F3E"/>
-                </a:solidFill>
-              </a:rPr>
-              <a:t>Fall/Winter Review</a:t>
-            </a:r>
-            <a:endParaRPr lang="en-US" dirty="0">
-              <a:solidFill>
-                <a:srgbClr val="202F3E"/>
-              </a:solidFill>
+          <a:lstStyle/>
+          <a:p>
+            <a:pPr>
+              <a:lnSpc>
+                <a:spcPct val="90000"/>
+              </a:lnSpc>
+            </a:pPr>
+            <a:r>
+              <a:rPr lang="en-US" sz="1400" b="1" dirty="0" smtClean="0">
+                <a:latin typeface="Helvetica"/>
+                <a:cs typeface="Helvetica"/>
+              </a:rPr>
+              <a:t>Section Three</a:t>
+            </a:r>
+          </a:p>
+          <a:p>
+            <a:pPr>
+              <a:lnSpc>
+                <a:spcPct val="110000"/>
+              </a:lnSpc>
+            </a:pPr>
+            <a:r>
+              <a:rPr lang="en-US" sz="1200" dirty="0" err="1" smtClean="0">
+                <a:latin typeface="Helvetica"/>
+                <a:cs typeface="Helvetica"/>
+              </a:rPr>
+              <a:t>Lorem</a:t>
+            </a:r>
+            <a:r>
+              <a:rPr lang="en-US" sz="1200" dirty="0" smtClean="0">
+                <a:latin typeface="Helvetica"/>
+                <a:cs typeface="Helvetica"/>
+              </a:rPr>
+              <a:t> </a:t>
+            </a:r>
+            <a:r>
+              <a:rPr lang="en-US" sz="1200" dirty="0" err="1">
+                <a:latin typeface="Helvetica"/>
+                <a:cs typeface="Helvetica"/>
+              </a:rPr>
+              <a:t>ipsum</a:t>
+            </a:r>
+            <a:r>
+              <a:rPr lang="en-US" sz="1200" dirty="0">
+                <a:latin typeface="Helvetica"/>
+                <a:cs typeface="Helvetica"/>
+              </a:rPr>
+              <a:t> dolor sit </a:t>
+            </a:r>
+            <a:r>
+              <a:rPr lang="en-US" sz="1200" dirty="0" err="1">
+                <a:latin typeface="Helvetica"/>
+                <a:cs typeface="Helvetica"/>
+              </a:rPr>
+              <a:t>amet</a:t>
+            </a:r>
+            <a:r>
+              <a:rPr lang="en-US" sz="1200" dirty="0">
+                <a:latin typeface="Helvetica"/>
+                <a:cs typeface="Helvetica"/>
+              </a:rPr>
+              <a:t>, </a:t>
+            </a:r>
+            <a:r>
+              <a:rPr lang="en-US" sz="1200" dirty="0" err="1">
+                <a:latin typeface="Helvetica"/>
+                <a:cs typeface="Helvetica"/>
+              </a:rPr>
+              <a:t>consectetur</a:t>
+            </a:r>
+            <a:r>
+              <a:rPr lang="en-US" sz="1200" dirty="0">
+                <a:latin typeface="Helvetica"/>
+                <a:cs typeface="Helvetica"/>
+              </a:rPr>
+              <a:t> </a:t>
+            </a:r>
+            <a:r>
+              <a:rPr lang="en-US" sz="1200" dirty="0" err="1">
+                <a:latin typeface="Helvetica"/>
+                <a:cs typeface="Helvetica"/>
+              </a:rPr>
+              <a:t>adipiscing</a:t>
+            </a:r>
+            <a:r>
+              <a:rPr lang="en-US" sz="1200" dirty="0">
+                <a:latin typeface="Helvetica"/>
+                <a:cs typeface="Helvetica"/>
+              </a:rPr>
+              <a:t> </a:t>
+            </a:r>
+            <a:r>
+              <a:rPr lang="en-US" sz="1200" dirty="0" err="1">
+                <a:latin typeface="Helvetica"/>
+                <a:cs typeface="Helvetica"/>
+              </a:rPr>
+              <a:t>elit</a:t>
+            </a:r>
+            <a:r>
+              <a:rPr lang="en-US" sz="1200" dirty="0">
+                <a:latin typeface="Helvetica"/>
+                <a:cs typeface="Helvetica"/>
+              </a:rPr>
+              <a:t>, </a:t>
+            </a:r>
+            <a:r>
+              <a:rPr lang="en-US" sz="1200" dirty="0" err="1">
+                <a:latin typeface="Helvetica"/>
+                <a:cs typeface="Helvetica"/>
+              </a:rPr>
+              <a:t>sed</a:t>
+            </a:r>
+            <a:r>
+              <a:rPr lang="en-US" sz="1200" dirty="0">
+                <a:latin typeface="Helvetica"/>
+                <a:cs typeface="Helvetica"/>
+              </a:rPr>
+              <a:t> do </a:t>
+            </a:r>
+            <a:r>
+              <a:rPr lang="en-US" sz="1200" dirty="0" err="1">
+                <a:latin typeface="Helvetica"/>
+                <a:cs typeface="Helvetica"/>
+              </a:rPr>
+              <a:t>eiusmod</a:t>
+            </a:r>
+            <a:r>
+              <a:rPr lang="en-US" sz="1200" dirty="0">
+                <a:latin typeface="Helvetica"/>
+                <a:cs typeface="Helvetica"/>
+              </a:rPr>
+              <a:t> </a:t>
+            </a:r>
+            <a:r>
+              <a:rPr lang="en-US" sz="1200" dirty="0" err="1">
+                <a:latin typeface="Helvetica"/>
+                <a:cs typeface="Helvetica"/>
+              </a:rPr>
+              <a:t>tempor</a:t>
+            </a:r>
+            <a:r>
+              <a:rPr lang="en-US" sz="1200" dirty="0">
+                <a:latin typeface="Helvetica"/>
+                <a:cs typeface="Helvetica"/>
+              </a:rPr>
+              <a:t> </a:t>
+            </a:r>
+            <a:r>
+              <a:rPr lang="en-US" sz="1200" dirty="0" err="1">
+                <a:latin typeface="Helvetica"/>
+                <a:cs typeface="Helvetica"/>
+              </a:rPr>
+              <a:t>incididunt</a:t>
+            </a:r>
+            <a:r>
+              <a:rPr lang="en-US" sz="1200" dirty="0">
+                <a:latin typeface="Helvetica"/>
+                <a:cs typeface="Helvetica"/>
+              </a:rPr>
+              <a:t> </a:t>
+            </a:r>
+            <a:r>
+              <a:rPr lang="en-US" sz="1200" dirty="0" err="1">
+                <a:latin typeface="Helvetica"/>
+                <a:cs typeface="Helvetica"/>
+              </a:rPr>
+              <a:t>ut</a:t>
+            </a:r>
+            <a:r>
+              <a:rPr lang="en-US" sz="1200" dirty="0">
+                <a:latin typeface="Helvetica"/>
+                <a:cs typeface="Helvetica"/>
+              </a:rPr>
+              <a:t> </a:t>
+            </a:r>
+            <a:r>
+              <a:rPr lang="en-US" sz="1200" dirty="0" err="1">
+                <a:latin typeface="Helvetica"/>
+                <a:cs typeface="Helvetica"/>
+              </a:rPr>
+              <a:t>labore</a:t>
+            </a:r>
+            <a:r>
+              <a:rPr lang="en-US" sz="1200" dirty="0">
+                <a:latin typeface="Helvetica"/>
+                <a:cs typeface="Helvetica"/>
+              </a:rPr>
+              <a:t> et </a:t>
+            </a:r>
+            <a:r>
+              <a:rPr lang="en-US" sz="1200" dirty="0" err="1">
+                <a:latin typeface="Helvetica"/>
+                <a:cs typeface="Helvetica"/>
+              </a:rPr>
+              <a:t>dolore</a:t>
+            </a:r>
+            <a:r>
+              <a:rPr lang="en-US" sz="1200" dirty="0">
+                <a:latin typeface="Helvetica"/>
+                <a:cs typeface="Helvetica"/>
+              </a:rPr>
+              <a:t> magna </a:t>
+            </a:r>
+            <a:r>
+              <a:rPr lang="en-US" sz="1200" dirty="0" err="1">
+                <a:latin typeface="Helvetica"/>
+                <a:cs typeface="Helvetica"/>
+              </a:rPr>
+              <a:t>aliqua</a:t>
+            </a:r>
+            <a:r>
+              <a:rPr lang="en-US" sz="1200" dirty="0">
+                <a:latin typeface="Helvetica"/>
+                <a:cs typeface="Helvetica"/>
+              </a:rPr>
+              <a:t>. </a:t>
+            </a:r>
+            <a:r>
+              <a:rPr lang="en-US" sz="1200" dirty="0" err="1">
+                <a:latin typeface="Helvetica"/>
+                <a:cs typeface="Helvetica"/>
+              </a:rPr>
+              <a:t>Ut</a:t>
+            </a:r>
+            <a:r>
+              <a:rPr lang="en-US" sz="1200" dirty="0">
+                <a:latin typeface="Helvetica"/>
+                <a:cs typeface="Helvetica"/>
+              </a:rPr>
+              <a:t> </a:t>
+            </a:r>
+            <a:r>
+              <a:rPr lang="en-US" sz="1200" dirty="0" err="1">
+                <a:latin typeface="Helvetica"/>
+                <a:cs typeface="Helvetica"/>
+              </a:rPr>
+              <a:t>enim</a:t>
+            </a:r>
+            <a:r>
+              <a:rPr lang="en-US" sz="1200" dirty="0">
+                <a:latin typeface="Helvetica"/>
+                <a:cs typeface="Helvetica"/>
+              </a:rPr>
+              <a:t> ad minim </a:t>
+            </a:r>
+            <a:r>
+              <a:rPr lang="en-US" sz="1200" dirty="0" err="1">
+                <a:latin typeface="Helvetica"/>
+                <a:cs typeface="Helvetica"/>
+              </a:rPr>
+              <a:t>veniam</a:t>
+            </a:r>
+            <a:r>
+              <a:rPr lang="en-US" sz="1200" dirty="0">
+                <a:latin typeface="Helvetica"/>
+                <a:cs typeface="Helvetica"/>
+              </a:rPr>
+              <a:t>, </a:t>
+            </a:r>
+            <a:r>
+              <a:rPr lang="en-US" sz="1200" dirty="0" err="1">
+                <a:latin typeface="Helvetica"/>
+                <a:cs typeface="Helvetica"/>
+              </a:rPr>
+              <a:t>quis</a:t>
+            </a:r>
+            <a:r>
+              <a:rPr lang="en-US" sz="1200" dirty="0">
+                <a:latin typeface="Helvetica"/>
+                <a:cs typeface="Helvetica"/>
+              </a:rPr>
+              <a:t> </a:t>
+            </a:r>
+            <a:r>
+              <a:rPr lang="en-US" sz="1200" dirty="0" err="1">
+                <a:latin typeface="Helvetica"/>
+                <a:cs typeface="Helvetica"/>
+              </a:rPr>
+              <a:t>nostrud</a:t>
+            </a:r>
+            <a:r>
+              <a:rPr lang="en-US" sz="1200" dirty="0">
+                <a:latin typeface="Helvetica"/>
+                <a:cs typeface="Helvetica"/>
+              </a:rPr>
+              <a:t> exercitation </a:t>
+            </a:r>
+            <a:r>
+              <a:rPr lang="en-US" sz="1200" dirty="0" err="1">
+                <a:latin typeface="Helvetica"/>
+                <a:cs typeface="Helvetica"/>
+              </a:rPr>
+              <a:t>ullamco</a:t>
+            </a:r>
+            <a:r>
+              <a:rPr lang="en-US" sz="1200" dirty="0">
+                <a:latin typeface="Helvetica"/>
+                <a:cs typeface="Helvetica"/>
+              </a:rPr>
+              <a:t> </a:t>
+            </a:r>
+            <a:r>
+              <a:rPr lang="en-US" sz="1200" dirty="0" err="1">
+                <a:latin typeface="Helvetica"/>
+                <a:cs typeface="Helvetica"/>
+              </a:rPr>
+              <a:t>laboris</a:t>
+            </a:r>
+            <a:r>
+              <a:rPr lang="en-US" sz="1200" dirty="0">
+                <a:latin typeface="Helvetica"/>
+                <a:cs typeface="Helvetica"/>
+              </a:rPr>
+              <a:t> nisi </a:t>
+            </a:r>
+            <a:r>
+              <a:rPr lang="en-US" sz="1200" dirty="0" err="1">
+                <a:latin typeface="Helvetica"/>
+                <a:cs typeface="Helvetica"/>
+              </a:rPr>
+              <a:t>ut</a:t>
+            </a:r>
+            <a:r>
+              <a:rPr lang="en-US" sz="1200" dirty="0">
+                <a:latin typeface="Helvetica"/>
+                <a:cs typeface="Helvetica"/>
+              </a:rPr>
+              <a:t> </a:t>
+            </a:r>
+            <a:r>
+              <a:rPr lang="en-US" sz="1200" dirty="0" err="1">
+                <a:latin typeface="Helvetica"/>
+                <a:cs typeface="Helvetica"/>
+              </a:rPr>
+              <a:t>aliquip</a:t>
+            </a:r>
+            <a:r>
+              <a:rPr lang="en-US" sz="1200" dirty="0">
+                <a:latin typeface="Helvetica"/>
+                <a:cs typeface="Helvetica"/>
+              </a:rPr>
+              <a:t> ex </a:t>
+            </a:r>
+            <a:r>
+              <a:rPr lang="en-US" sz="1200" dirty="0" err="1">
+                <a:latin typeface="Helvetica"/>
+                <a:cs typeface="Helvetica"/>
+              </a:rPr>
+              <a:t>ea</a:t>
+            </a:r>
+            <a:r>
+              <a:rPr lang="en-US" sz="1200" dirty="0">
+                <a:latin typeface="Helvetica"/>
+                <a:cs typeface="Helvetica"/>
+              </a:rPr>
+              <a:t> </a:t>
+            </a:r>
+            <a:r>
+              <a:rPr lang="en-US" sz="1200" dirty="0" err="1">
+                <a:latin typeface="Helvetica"/>
+                <a:cs typeface="Helvetica"/>
+              </a:rPr>
+              <a:t>commodo</a:t>
+            </a:r>
+            <a:r>
+              <a:rPr lang="en-US" sz="1200" dirty="0">
+                <a:latin typeface="Helvetica"/>
+                <a:cs typeface="Helvetica"/>
+              </a:rPr>
+              <a:t> </a:t>
+            </a:r>
+            <a:r>
+              <a:rPr lang="en-US" sz="1200" dirty="0" err="1">
+                <a:latin typeface="Helvetica"/>
+                <a:cs typeface="Helvetica"/>
+              </a:rPr>
+              <a:t>consequat</a:t>
+            </a:r>
+            <a:r>
+              <a:rPr lang="en-US" sz="1200" dirty="0">
+                <a:latin typeface="Helvetica"/>
+                <a:cs typeface="Helvetica"/>
+              </a:rPr>
+              <a:t>. </a:t>
+            </a:r>
+            <a:r>
+              <a:rPr lang="en-US" sz="1200" dirty="0" err="1">
+                <a:latin typeface="Helvetica"/>
+                <a:cs typeface="Helvetica"/>
+              </a:rPr>
+              <a:t>Duis</a:t>
+            </a:r>
+            <a:r>
+              <a:rPr lang="en-US" sz="1200" dirty="0">
+                <a:latin typeface="Helvetica"/>
+                <a:cs typeface="Helvetica"/>
+              </a:rPr>
+              <a:t> </a:t>
+            </a:r>
+            <a:r>
+              <a:rPr lang="en-US" sz="1200" dirty="0" err="1">
+                <a:latin typeface="Helvetica"/>
+                <a:cs typeface="Helvetica"/>
+              </a:rPr>
+              <a:t>aute</a:t>
+            </a:r>
+            <a:r>
+              <a:rPr lang="en-US" sz="1200" dirty="0">
+                <a:latin typeface="Helvetica"/>
+                <a:cs typeface="Helvetica"/>
+              </a:rPr>
+              <a:t> </a:t>
+            </a:r>
+            <a:r>
+              <a:rPr lang="en-US" sz="1200" dirty="0" err="1">
+                <a:latin typeface="Helvetica"/>
+                <a:cs typeface="Helvetica"/>
+              </a:rPr>
+              <a:t>irure</a:t>
+            </a:r>
+            <a:r>
+              <a:rPr lang="en-US" sz="1200" dirty="0">
+                <a:latin typeface="Helvetica"/>
+                <a:cs typeface="Helvetica"/>
+              </a:rPr>
+              <a:t> dolor in </a:t>
+            </a:r>
+            <a:r>
+              <a:rPr lang="en-US" sz="1200" dirty="0" err="1">
+                <a:latin typeface="Helvetica"/>
+                <a:cs typeface="Helvetica"/>
+              </a:rPr>
+              <a:t>reprehenderit</a:t>
+            </a:r>
+            <a:r>
+              <a:rPr lang="en-US" sz="1200" dirty="0">
+                <a:latin typeface="Helvetica"/>
+                <a:cs typeface="Helvetica"/>
+              </a:rPr>
+              <a:t> in </a:t>
+            </a:r>
+            <a:r>
+              <a:rPr lang="en-US" sz="1200" dirty="0" err="1">
+                <a:latin typeface="Helvetica"/>
+                <a:cs typeface="Helvetica"/>
+              </a:rPr>
+              <a:t>voluptate</a:t>
+            </a:r>
+            <a:r>
+              <a:rPr lang="en-US" sz="1200" dirty="0">
+                <a:latin typeface="Helvetica"/>
+                <a:cs typeface="Helvetica"/>
+              </a:rPr>
+              <a:t> </a:t>
+            </a:r>
+            <a:r>
+              <a:rPr lang="en-US" sz="1200" dirty="0" err="1">
+                <a:latin typeface="Helvetica"/>
+                <a:cs typeface="Helvetica"/>
+              </a:rPr>
+              <a:t>velit</a:t>
+            </a:r>
+            <a:r>
+              <a:rPr lang="en-US" sz="1200" dirty="0">
+                <a:latin typeface="Helvetica"/>
+                <a:cs typeface="Helvetica"/>
+              </a:rPr>
+              <a:t> </a:t>
+            </a:r>
+            <a:r>
+              <a:rPr lang="en-US" sz="1200" dirty="0" err="1">
+                <a:latin typeface="Helvetica"/>
+                <a:cs typeface="Helvetica"/>
+              </a:rPr>
+              <a:t>esse</a:t>
+            </a:r>
+            <a:r>
+              <a:rPr lang="en-US" sz="1200" dirty="0">
+                <a:latin typeface="Helvetica"/>
+                <a:cs typeface="Helvetica"/>
+              </a:rPr>
+              <a:t> </a:t>
+            </a:r>
+            <a:r>
+              <a:rPr lang="en-US" sz="1200" dirty="0" err="1">
+                <a:latin typeface="Helvetica"/>
+                <a:cs typeface="Helvetica"/>
+              </a:rPr>
+              <a:t>cillum</a:t>
+            </a:r>
+            <a:r>
+              <a:rPr lang="en-US" sz="1200" dirty="0">
+                <a:latin typeface="Helvetica"/>
+                <a:cs typeface="Helvetica"/>
+              </a:rPr>
+              <a:t> </a:t>
+            </a:r>
+            <a:r>
+              <a:rPr lang="en-US" sz="1200" dirty="0" err="1">
+                <a:latin typeface="Helvetica"/>
+                <a:cs typeface="Helvetica"/>
+              </a:rPr>
+              <a:t>dolore</a:t>
+            </a:r>
+            <a:r>
+              <a:rPr lang="en-US" sz="1200" dirty="0">
+                <a:latin typeface="Helvetica"/>
+                <a:cs typeface="Helvetica"/>
+              </a:rPr>
+              <a:t> </a:t>
+            </a:r>
+            <a:r>
+              <a:rPr lang="en-US" sz="1200" dirty="0" err="1">
+                <a:latin typeface="Helvetica"/>
+                <a:cs typeface="Helvetica"/>
+              </a:rPr>
+              <a:t>eu</a:t>
+            </a:r>
+            <a:r>
+              <a:rPr lang="en-US" sz="1200" dirty="0">
+                <a:latin typeface="Helvetica"/>
+                <a:cs typeface="Helvetica"/>
+              </a:rPr>
+              <a:t> </a:t>
+            </a:r>
+            <a:r>
+              <a:rPr lang="en-US" sz="1200" dirty="0" err="1">
+                <a:latin typeface="Helvetica"/>
+                <a:cs typeface="Helvetica"/>
+              </a:rPr>
+              <a:t>fugiat</a:t>
+            </a:r>
+            <a:r>
+              <a:rPr lang="en-US" sz="1200" dirty="0">
+                <a:latin typeface="Helvetica"/>
+                <a:cs typeface="Helvetica"/>
+              </a:rPr>
+              <a:t> </a:t>
+            </a:r>
+            <a:r>
+              <a:rPr lang="en-US" sz="1200" dirty="0" err="1">
+                <a:latin typeface="Helvetica"/>
+                <a:cs typeface="Helvetica"/>
+              </a:rPr>
+              <a:t>nulla</a:t>
+            </a:r>
+            <a:r>
+              <a:rPr lang="en-US" sz="1200" dirty="0">
+                <a:latin typeface="Helvetica"/>
+                <a:cs typeface="Helvetica"/>
+              </a:rPr>
+              <a:t> </a:t>
+            </a:r>
+            <a:r>
+              <a:rPr lang="en-US" sz="1200" dirty="0" err="1">
+                <a:latin typeface="Helvetica"/>
+                <a:cs typeface="Helvetica"/>
+              </a:rPr>
+              <a:t>pariatur</a:t>
+            </a:r>
+            <a:r>
+              <a:rPr lang="en-US" sz="1200" dirty="0" smtClean="0">
+                <a:latin typeface="Helvetica"/>
+                <a:cs typeface="Helvetica"/>
+              </a:rPr>
+              <a:t>.</a:t>
+            </a:r>
+            <a:endParaRPr lang="en-US" sz="1200" dirty="0">
+              <a:latin typeface="Helvetica"/>
+              <a:cs typeface="Helvetica"/>
             </a:endParaRPr>
           </a:p>
         </p:txBody>
       </p:sp>
       <p:sp>
         <p:nvSpPr>
-          <p:cNvPr id="17" name="Content Placeholder 11"/>
-          <p:cNvSpPr>
-            <a:spLocks noGrp="1"/>
-          </p:cNvSpPr>
-          <p:nvPr>
-            <p:ph idx="1"/>
-          </p:nvPr>
+          <p:cNvPr id="25" name="TextBox 24"/>
+          <p:cNvSpPr txBox="1"/>
+          <p:nvPr/>
         </p:nvSpPr>
         <p:spPr>
           <a:xfrm>
-            <a:off x="457200" y="2360584"/>
-            <a:ext cx="8229600" cy="2488847"/>
+            <a:off x="6275292" y="3569985"/>
+            <a:ext cx="2644588" cy="1695849"/>
           </a:xfrm>
+          <a:prstGeom prst="rect">
+            <a:avLst/>
+          </a:prstGeom>
+          <a:noFill/>
+          <a:ln w="28575" cmpd="sng">
+            <a:solidFill>
+              <a:schemeClr val="tx1"/>
+            </a:solidFill>
+          </a:ln>
         </p:spPr>
         <p:txBody>
-          <a:bodyPr>
-            <a:normAutofit fontScale="92500" lnSpcReduction="20000"/>
+          <a:bodyPr wrap="square" rtlCol="0">
+            <a:spAutoFit/>
           </a:bodyPr>
           <a:lstStyle/>
           <a:p>
             <a:pPr>
-              <a:buClr>
-                <a:srgbClr val="202F3E"/>
-              </a:buClr>
+              <a:lnSpc>
+                <a:spcPct val="90000"/>
+              </a:lnSpc>
             </a:pPr>
             <a:r>
-              <a:rPr lang="en-US" smtClean="0">
-                <a:solidFill>
-                  <a:srgbClr val="202F3E"/>
-                </a:solidFill>
-              </a:rPr>
-              <a:t>Soft Launch</a:t>
-            </a:r>
+              <a:rPr lang="en-US" sz="1200" b="1" dirty="0">
+                <a:latin typeface="Helvetica"/>
+                <a:cs typeface="Helvetica"/>
+              </a:rPr>
+              <a:t>Section </a:t>
+            </a:r>
+            <a:r>
+              <a:rPr lang="en-US" sz="1200" b="1" dirty="0" smtClean="0">
+                <a:latin typeface="Helvetica"/>
+                <a:cs typeface="Helvetica"/>
+              </a:rPr>
+              <a:t>Four</a:t>
+            </a:r>
+            <a:endParaRPr lang="en-US" sz="1200" dirty="0" smtClean="0">
+              <a:latin typeface="Helvetica"/>
+              <a:cs typeface="Helvetica"/>
+            </a:endParaRPr>
           </a:p>
           <a:p>
             <a:pPr>
-              <a:buClr>
-                <a:srgbClr val="202F3E"/>
-              </a:buClr>
+              <a:lnSpc>
+                <a:spcPct val="110000"/>
+              </a:lnSpc>
             </a:pPr>
             <a:r>
-              <a:rPr lang="en-US" dirty="0" smtClean="0">
-                <a:solidFill>
-                  <a:srgbClr val="202F3E"/>
-                </a:solidFill>
-              </a:rPr>
-              <a:t>DRS Training</a:t>
-            </a:r>
-          </a:p>
-          <a:p>
-            <a:pPr>
-              <a:buClr>
-                <a:srgbClr val="202F3E"/>
-              </a:buClr>
-            </a:pPr>
-            <a:r>
-              <a:rPr lang="en-US" dirty="0" smtClean="0">
-                <a:solidFill>
-                  <a:srgbClr val="202F3E"/>
-                </a:solidFill>
-              </a:rPr>
-              <a:t>Usability Testing</a:t>
-            </a:r>
-          </a:p>
-          <a:p>
-            <a:pPr>
-              <a:buClr>
-                <a:srgbClr val="202F3E"/>
-              </a:buClr>
-            </a:pPr>
-            <a:r>
-              <a:rPr lang="en-US" dirty="0" smtClean="0">
-                <a:solidFill>
-                  <a:srgbClr val="202F3E"/>
-                </a:solidFill>
-              </a:rPr>
-              <a:t>Handout Materials</a:t>
-            </a:r>
-          </a:p>
-          <a:p>
-            <a:pPr>
-              <a:buClr>
-                <a:srgbClr val="202F3E"/>
-              </a:buClr>
-            </a:pPr>
-            <a:r>
-              <a:rPr lang="en-US" i="1" dirty="0" smtClean="0">
-                <a:solidFill>
-                  <a:srgbClr val="202F3E"/>
-                </a:solidFill>
-              </a:rPr>
-              <a:t>URL Change</a:t>
-            </a:r>
-            <a:r>
-              <a:rPr lang="en-US" dirty="0" smtClean="0">
-                <a:solidFill>
-                  <a:srgbClr val="202F3E"/>
-                </a:solidFill>
-              </a:rPr>
-              <a:t>:</a:t>
-            </a:r>
-            <a:endParaRPr lang="en-US" dirty="0">
-              <a:solidFill>
-                <a:srgbClr val="202F3E"/>
-              </a:solidFill>
+              <a:rPr lang="en-US" sz="1200" dirty="0" err="1" smtClean="0">
+                <a:latin typeface="Helvetica"/>
+                <a:cs typeface="Helvetica"/>
+              </a:rPr>
+              <a:t>Lorem</a:t>
+            </a:r>
+            <a:r>
+              <a:rPr lang="en-US" sz="1200" dirty="0" smtClean="0">
+                <a:latin typeface="Helvetica"/>
+                <a:cs typeface="Helvetica"/>
+              </a:rPr>
+              <a:t> </a:t>
+            </a:r>
+            <a:r>
+              <a:rPr lang="en-US" sz="1200" dirty="0" err="1">
+                <a:latin typeface="Helvetica"/>
+                <a:cs typeface="Helvetica"/>
+              </a:rPr>
+              <a:t>ipsum</a:t>
+            </a:r>
+            <a:r>
+              <a:rPr lang="en-US" sz="1200" dirty="0">
+                <a:latin typeface="Helvetica"/>
+                <a:cs typeface="Helvetica"/>
+              </a:rPr>
+              <a:t> dolor sit </a:t>
+            </a:r>
+            <a:r>
+              <a:rPr lang="en-US" sz="1200" dirty="0" err="1">
+                <a:latin typeface="Helvetica"/>
+                <a:cs typeface="Helvetica"/>
+              </a:rPr>
+              <a:t>amet</a:t>
+            </a:r>
+            <a:r>
+              <a:rPr lang="en-US" sz="1200" dirty="0">
+                <a:latin typeface="Helvetica"/>
+                <a:cs typeface="Helvetica"/>
+              </a:rPr>
+              <a:t>, </a:t>
+            </a:r>
+            <a:r>
+              <a:rPr lang="en-US" sz="1200" dirty="0" err="1">
+                <a:latin typeface="Helvetica"/>
+                <a:cs typeface="Helvetica"/>
+              </a:rPr>
+              <a:t>consectetur</a:t>
+            </a:r>
+            <a:r>
+              <a:rPr lang="en-US" sz="1200" dirty="0">
+                <a:latin typeface="Helvetica"/>
+                <a:cs typeface="Helvetica"/>
+              </a:rPr>
+              <a:t> </a:t>
+            </a:r>
+            <a:r>
+              <a:rPr lang="en-US" sz="1200" dirty="0" err="1">
+                <a:latin typeface="Helvetica"/>
+                <a:cs typeface="Helvetica"/>
+              </a:rPr>
+              <a:t>adipiscing</a:t>
+            </a:r>
+            <a:r>
+              <a:rPr lang="en-US" sz="1200" dirty="0">
+                <a:latin typeface="Helvetica"/>
+                <a:cs typeface="Helvetica"/>
+              </a:rPr>
+              <a:t> </a:t>
+            </a:r>
+            <a:r>
+              <a:rPr lang="en-US" sz="1200" dirty="0" err="1">
+                <a:latin typeface="Helvetica"/>
+                <a:cs typeface="Helvetica"/>
+              </a:rPr>
+              <a:t>elit</a:t>
+            </a:r>
+            <a:r>
+              <a:rPr lang="en-US" sz="1200" dirty="0">
+                <a:latin typeface="Helvetica"/>
+                <a:cs typeface="Helvetica"/>
+              </a:rPr>
+              <a:t>, </a:t>
+            </a:r>
+            <a:r>
+              <a:rPr lang="en-US" sz="1200" dirty="0" err="1">
+                <a:latin typeface="Helvetica"/>
+                <a:cs typeface="Helvetica"/>
+              </a:rPr>
+              <a:t>sed</a:t>
+            </a:r>
+            <a:r>
+              <a:rPr lang="en-US" sz="1200" dirty="0">
+                <a:latin typeface="Helvetica"/>
+                <a:cs typeface="Helvetica"/>
+              </a:rPr>
+              <a:t> do </a:t>
+            </a:r>
+            <a:r>
+              <a:rPr lang="en-US" sz="1200" dirty="0" err="1">
+                <a:latin typeface="Helvetica"/>
+                <a:cs typeface="Helvetica"/>
+              </a:rPr>
+              <a:t>eiusmod</a:t>
+            </a:r>
+            <a:r>
+              <a:rPr lang="en-US" sz="1200" dirty="0">
+                <a:latin typeface="Helvetica"/>
+                <a:cs typeface="Helvetica"/>
+              </a:rPr>
+              <a:t> </a:t>
+            </a:r>
+            <a:r>
+              <a:rPr lang="en-US" sz="1200" dirty="0" err="1">
+                <a:latin typeface="Helvetica"/>
+                <a:cs typeface="Helvetica"/>
+              </a:rPr>
+              <a:t>tempor</a:t>
+            </a:r>
+            <a:r>
+              <a:rPr lang="en-US" sz="1200" dirty="0">
+                <a:latin typeface="Helvetica"/>
+                <a:cs typeface="Helvetica"/>
+              </a:rPr>
+              <a:t> </a:t>
+            </a:r>
+            <a:r>
+              <a:rPr lang="en-US" sz="1200" dirty="0" err="1">
+                <a:latin typeface="Helvetica"/>
+                <a:cs typeface="Helvetica"/>
+              </a:rPr>
+              <a:t>incididunt</a:t>
+            </a:r>
+            <a:r>
+              <a:rPr lang="en-US" sz="1200" dirty="0">
+                <a:latin typeface="Helvetica"/>
+                <a:cs typeface="Helvetica"/>
+              </a:rPr>
+              <a:t> </a:t>
+            </a:r>
+            <a:r>
+              <a:rPr lang="en-US" sz="1200" dirty="0" err="1">
+                <a:latin typeface="Helvetica"/>
+                <a:cs typeface="Helvetica"/>
+              </a:rPr>
+              <a:t>ut</a:t>
+            </a:r>
+            <a:r>
+              <a:rPr lang="en-US" sz="1200" dirty="0">
+                <a:latin typeface="Helvetica"/>
+                <a:cs typeface="Helvetica"/>
+              </a:rPr>
+              <a:t> </a:t>
+            </a:r>
+            <a:r>
+              <a:rPr lang="en-US" sz="1200" dirty="0" err="1">
+                <a:latin typeface="Helvetica"/>
+                <a:cs typeface="Helvetica"/>
+              </a:rPr>
+              <a:t>labore</a:t>
+            </a:r>
+            <a:r>
+              <a:rPr lang="en-US" sz="1200" dirty="0">
+                <a:latin typeface="Helvetica"/>
+                <a:cs typeface="Helvetica"/>
+              </a:rPr>
+              <a:t> et </a:t>
+            </a:r>
+            <a:r>
+              <a:rPr lang="en-US" sz="1200" dirty="0" err="1">
+                <a:latin typeface="Helvetica"/>
+                <a:cs typeface="Helvetica"/>
+              </a:rPr>
+              <a:t>dolore</a:t>
+            </a:r>
+            <a:r>
+              <a:rPr lang="en-US" sz="1200" dirty="0">
+                <a:latin typeface="Helvetica"/>
+                <a:cs typeface="Helvetica"/>
+              </a:rPr>
+              <a:t> magna </a:t>
+            </a:r>
+            <a:r>
+              <a:rPr lang="en-US" sz="1200" dirty="0" err="1">
+                <a:latin typeface="Helvetica"/>
+                <a:cs typeface="Helvetica"/>
+              </a:rPr>
+              <a:t>aliqua</a:t>
+            </a:r>
+            <a:r>
+              <a:rPr lang="en-US" sz="1200" dirty="0">
+                <a:latin typeface="Helvetica"/>
+                <a:cs typeface="Helvetica"/>
+              </a:rPr>
+              <a:t>. </a:t>
+            </a:r>
+            <a:r>
+              <a:rPr lang="en-US" sz="1200" dirty="0" err="1">
+                <a:latin typeface="Helvetica"/>
+                <a:cs typeface="Helvetica"/>
+              </a:rPr>
+              <a:t>Ut</a:t>
+            </a:r>
+            <a:r>
+              <a:rPr lang="en-US" sz="1200" dirty="0">
+                <a:latin typeface="Helvetica"/>
+                <a:cs typeface="Helvetica"/>
+              </a:rPr>
+              <a:t> </a:t>
+            </a:r>
+            <a:r>
+              <a:rPr lang="en-US" sz="1200" dirty="0" err="1">
+                <a:latin typeface="Helvetica"/>
+                <a:cs typeface="Helvetica"/>
+              </a:rPr>
+              <a:t>enim</a:t>
+            </a:r>
+            <a:r>
+              <a:rPr lang="en-US" sz="1200" dirty="0">
+                <a:latin typeface="Helvetica"/>
+                <a:cs typeface="Helvetica"/>
+              </a:rPr>
+              <a:t> ad minim </a:t>
+            </a:r>
+            <a:r>
+              <a:rPr lang="en-US" sz="1200" dirty="0" err="1">
+                <a:latin typeface="Helvetica"/>
+                <a:cs typeface="Helvetica"/>
+              </a:rPr>
+              <a:t>veniam</a:t>
+            </a:r>
+            <a:r>
+              <a:rPr lang="en-US" sz="1200" dirty="0">
+                <a:latin typeface="Helvetica"/>
+                <a:cs typeface="Helvetica"/>
+              </a:rPr>
+              <a:t>, </a:t>
+            </a:r>
+            <a:r>
+              <a:rPr lang="en-US" sz="1200" dirty="0" err="1">
+                <a:latin typeface="Helvetica"/>
+                <a:cs typeface="Helvetica"/>
+              </a:rPr>
+              <a:t>quis</a:t>
+            </a:r>
+            <a:r>
+              <a:rPr lang="en-US" sz="1200" dirty="0">
+                <a:latin typeface="Helvetica"/>
+                <a:cs typeface="Helvetica"/>
+              </a:rPr>
+              <a:t> </a:t>
+            </a:r>
+            <a:r>
+              <a:rPr lang="en-US" sz="1200" dirty="0" err="1">
+                <a:latin typeface="Helvetica"/>
+                <a:cs typeface="Helvetica"/>
+              </a:rPr>
+              <a:t>nostrud</a:t>
+            </a:r>
+            <a:r>
+              <a:rPr lang="en-US" sz="1200" dirty="0">
+                <a:latin typeface="Helvetica"/>
+                <a:cs typeface="Helvetica"/>
+              </a:rPr>
+              <a:t> exercitation </a:t>
+            </a:r>
+            <a:r>
+              <a:rPr lang="en-US" sz="1200" dirty="0" err="1">
+                <a:latin typeface="Helvetica"/>
+                <a:cs typeface="Helvetica"/>
+              </a:rPr>
+              <a:t>ullamco</a:t>
+            </a:r>
+            <a:r>
+              <a:rPr lang="en-US" sz="1200" dirty="0">
+                <a:latin typeface="Helvetica"/>
+                <a:cs typeface="Helvetica"/>
+              </a:rPr>
+              <a:t> </a:t>
+            </a:r>
+            <a:r>
+              <a:rPr lang="en-US" sz="1200" dirty="0" err="1">
+                <a:latin typeface="Helvetica"/>
+                <a:cs typeface="Helvetica"/>
+              </a:rPr>
+              <a:t>laboris</a:t>
+            </a:r>
+            <a:r>
+              <a:rPr lang="en-US" sz="1200" dirty="0">
+                <a:latin typeface="Helvetica"/>
+                <a:cs typeface="Helvetica"/>
+              </a:rPr>
+              <a:t> nisi </a:t>
+            </a:r>
+            <a:r>
+              <a:rPr lang="en-US" sz="1200" dirty="0" err="1">
+                <a:latin typeface="Helvetica"/>
+                <a:cs typeface="Helvetica"/>
+              </a:rPr>
+              <a:t>ut</a:t>
+            </a:r>
+            <a:r>
+              <a:rPr lang="en-US" sz="1200" dirty="0">
+                <a:latin typeface="Helvetica"/>
+                <a:cs typeface="Helvetica"/>
+              </a:rPr>
+              <a:t> </a:t>
+            </a:r>
+            <a:r>
+              <a:rPr lang="en-US" sz="1200" dirty="0" err="1">
+                <a:latin typeface="Helvetica"/>
+                <a:cs typeface="Helvetica"/>
+              </a:rPr>
+              <a:t>aliquip</a:t>
+            </a:r>
+            <a:r>
+              <a:rPr lang="en-US" sz="1200" dirty="0">
+                <a:latin typeface="Helvetica"/>
+                <a:cs typeface="Helvetica"/>
+              </a:rPr>
+              <a:t> ex </a:t>
+            </a:r>
+            <a:r>
+              <a:rPr lang="en-US" sz="1200" dirty="0" err="1">
+                <a:latin typeface="Helvetica"/>
+                <a:cs typeface="Helvetica"/>
+              </a:rPr>
+              <a:t>ea</a:t>
+            </a:r>
+            <a:r>
+              <a:rPr lang="en-US" sz="1200" dirty="0">
+                <a:latin typeface="Helvetica"/>
+                <a:cs typeface="Helvetica"/>
+              </a:rPr>
+              <a:t> </a:t>
+            </a:r>
+            <a:r>
+              <a:rPr lang="en-US" sz="1200" dirty="0" err="1">
+                <a:latin typeface="Helvetica"/>
+                <a:cs typeface="Helvetica"/>
+              </a:rPr>
+              <a:t>commodo</a:t>
+            </a:r>
+            <a:r>
+              <a:rPr lang="en-US" sz="1200" dirty="0">
+                <a:latin typeface="Helvetica"/>
+                <a:cs typeface="Helvetica"/>
+              </a:rPr>
+              <a:t> </a:t>
+            </a:r>
+            <a:r>
+              <a:rPr lang="en-US" sz="1200" dirty="0" err="1">
+                <a:latin typeface="Helvetica"/>
+                <a:cs typeface="Helvetica"/>
+              </a:rPr>
+              <a:t>consequat</a:t>
+            </a:r>
+            <a:r>
+              <a:rPr lang="en-US" sz="1200" dirty="0" smtClean="0">
+                <a:latin typeface="Helvetica"/>
+                <a:cs typeface="Helvetica"/>
+              </a:rPr>
+              <a:t>.</a:t>
+            </a:r>
+            <a:endParaRPr lang="en-US" sz="1200" dirty="0">
+              <a:latin typeface="Helvetica"/>
+              <a:cs typeface="Helvetica"/>
             </a:endParaRPr>
           </a:p>
         </p:txBody>
       </p:sp>
-      <p:sp>
-        <p:nvSpPr>
-          <p:cNvPr id="18" name="TextBox 17"/>
+      <p:pic>
+        <p:nvPicPr>
+          <p:cNvPr id="26" name="Picture 25" descr="screencapture-repository-library-northeastern-edu-1430517316805.png"/>
+          <p:cNvPicPr>
+            <a:picLocks noChangeAspect="1"/>
+          </p:cNvPicPr>
+          <p:nvPr/>
+        </p:nvPicPr>
+        <p:blipFill>
+          <a:blip r:embed="rId2">
+            <a:extLst>
+              <a:ext uri="{28A0092B-C50C-407E-A947-70E740481C1C}">
+                <a14:useLocalDpi xmlns:a14="http://schemas.microsoft.com/office/drawing/2010/main" val="0"/>
+              </a:ext>
+            </a:extLst>
+          </a:blip>
+          <a:stretch>
+            <a:fillRect/>
+          </a:stretch>
+        </p:blipFill>
+        <p:spPr>
+          <a:xfrm>
+            <a:off x="6275293" y="1130315"/>
+            <a:ext cx="2644587" cy="1992345"/>
+          </a:xfrm>
+          <a:prstGeom prst="rect">
+            <a:avLst/>
+          </a:prstGeom>
+          <a:ln w="28575" cmpd="sng">
+            <a:solidFill>
+              <a:srgbClr val="000000"/>
+            </a:solidFill>
+          </a:ln>
+        </p:spPr>
+      </p:pic>
+      <p:sp>
+        <p:nvSpPr>
+          <p:cNvPr id="28" name="TextBox 27"/>
           <p:cNvSpPr txBox="1"/>
           <p:nvPr/>
         </p:nvSpPr>
         <p:spPr>
           <a:xfrm>
-            <a:off x="321312" y="5052387"/>
-            <a:ext cx="8503193" cy="646331"/>
+            <a:off x="208947" y="4890363"/>
+            <a:ext cx="2644588" cy="1705082"/>
+          </a:xfrm>
+          <a:prstGeom prst="rect">
+            <a:avLst/>
+          </a:prstGeom>
+          <a:noFill/>
+          <a:ln w="28575" cmpd="sng">
+            <a:solidFill>
+              <a:schemeClr val="tx1"/>
+            </a:solidFill>
+          </a:ln>
+        </p:spPr>
+        <p:txBody>
+          <a:bodyPr wrap="square" rtlCol="0">
+            <a:spAutoFit/>
+          </a:bodyPr>
+          <a:lstStyle/>
+          <a:p>
+            <a:pPr>
+              <a:lnSpc>
+                <a:spcPct val="90000"/>
+              </a:lnSpc>
+            </a:pPr>
+            <a:r>
+              <a:rPr lang="en-US" sz="1400" b="1" dirty="0" smtClean="0">
+                <a:latin typeface="Helvetica"/>
+                <a:cs typeface="Helvetica"/>
+              </a:rPr>
+              <a:t>Section Two</a:t>
+            </a:r>
+          </a:p>
+          <a:p>
+            <a:pPr>
+              <a:lnSpc>
+                <a:spcPct val="110000"/>
+              </a:lnSpc>
+            </a:pPr>
+            <a:r>
+              <a:rPr lang="en-US" sz="1200" dirty="0" err="1" smtClean="0">
+                <a:latin typeface="Helvetica"/>
+                <a:cs typeface="Helvetica"/>
+              </a:rPr>
+              <a:t>Lorem</a:t>
+            </a:r>
+            <a:r>
+              <a:rPr lang="en-US" sz="1200" dirty="0" smtClean="0">
+                <a:latin typeface="Helvetica"/>
+                <a:cs typeface="Helvetica"/>
+              </a:rPr>
+              <a:t> </a:t>
+            </a:r>
+            <a:r>
+              <a:rPr lang="en-US" sz="1200" dirty="0" err="1">
+                <a:latin typeface="Helvetica"/>
+                <a:cs typeface="Helvetica"/>
+              </a:rPr>
+              <a:t>ipsum</a:t>
+            </a:r>
+            <a:r>
+              <a:rPr lang="en-US" sz="1200" dirty="0">
+                <a:latin typeface="Helvetica"/>
+                <a:cs typeface="Helvetica"/>
+              </a:rPr>
+              <a:t> dolor sit </a:t>
+            </a:r>
+            <a:r>
+              <a:rPr lang="en-US" sz="1200" dirty="0" err="1">
+                <a:latin typeface="Helvetica"/>
+                <a:cs typeface="Helvetica"/>
+              </a:rPr>
+              <a:t>amet</a:t>
+            </a:r>
+            <a:r>
+              <a:rPr lang="en-US" sz="1200" dirty="0">
+                <a:latin typeface="Helvetica"/>
+                <a:cs typeface="Helvetica"/>
+              </a:rPr>
+              <a:t>, </a:t>
+            </a:r>
+            <a:r>
+              <a:rPr lang="en-US" sz="1200" dirty="0" err="1">
+                <a:latin typeface="Helvetica"/>
+                <a:cs typeface="Helvetica"/>
+              </a:rPr>
+              <a:t>consectetur</a:t>
+            </a:r>
+            <a:r>
+              <a:rPr lang="en-US" sz="1200" dirty="0">
+                <a:latin typeface="Helvetica"/>
+                <a:cs typeface="Helvetica"/>
+              </a:rPr>
+              <a:t> </a:t>
+            </a:r>
+            <a:r>
+              <a:rPr lang="en-US" sz="1200" dirty="0" err="1">
+                <a:latin typeface="Helvetica"/>
+                <a:cs typeface="Helvetica"/>
+              </a:rPr>
+              <a:t>adipiscing</a:t>
+            </a:r>
+            <a:r>
+              <a:rPr lang="en-US" sz="1200" dirty="0">
+                <a:latin typeface="Helvetica"/>
+                <a:cs typeface="Helvetica"/>
+              </a:rPr>
+              <a:t> </a:t>
+            </a:r>
+            <a:r>
+              <a:rPr lang="en-US" sz="1200" dirty="0" err="1">
+                <a:latin typeface="Helvetica"/>
+                <a:cs typeface="Helvetica"/>
+              </a:rPr>
+              <a:t>elit</a:t>
+            </a:r>
+            <a:r>
+              <a:rPr lang="en-US" sz="1200" dirty="0">
+                <a:latin typeface="Helvetica"/>
+                <a:cs typeface="Helvetica"/>
+              </a:rPr>
+              <a:t>, </a:t>
+            </a:r>
+            <a:r>
+              <a:rPr lang="en-US" sz="1200" dirty="0" err="1">
+                <a:latin typeface="Helvetica"/>
+                <a:cs typeface="Helvetica"/>
+              </a:rPr>
+              <a:t>sed</a:t>
+            </a:r>
+            <a:r>
+              <a:rPr lang="en-US" sz="1200" dirty="0">
+                <a:latin typeface="Helvetica"/>
+                <a:cs typeface="Helvetica"/>
+              </a:rPr>
+              <a:t> do </a:t>
+            </a:r>
+            <a:r>
+              <a:rPr lang="en-US" sz="1200" dirty="0" err="1">
+                <a:latin typeface="Helvetica"/>
+                <a:cs typeface="Helvetica"/>
+              </a:rPr>
+              <a:t>eiusmod</a:t>
+            </a:r>
+            <a:r>
+              <a:rPr lang="en-US" sz="1200" dirty="0">
+                <a:latin typeface="Helvetica"/>
+                <a:cs typeface="Helvetica"/>
+              </a:rPr>
+              <a:t> </a:t>
+            </a:r>
+            <a:r>
+              <a:rPr lang="en-US" sz="1200" dirty="0" err="1">
+                <a:latin typeface="Helvetica"/>
+                <a:cs typeface="Helvetica"/>
+              </a:rPr>
+              <a:t>tempor</a:t>
+            </a:r>
+            <a:r>
+              <a:rPr lang="en-US" sz="1200" dirty="0">
+                <a:latin typeface="Helvetica"/>
+                <a:cs typeface="Helvetica"/>
+              </a:rPr>
+              <a:t> </a:t>
+            </a:r>
+            <a:r>
+              <a:rPr lang="en-US" sz="1200" dirty="0" err="1">
+                <a:latin typeface="Helvetica"/>
+                <a:cs typeface="Helvetica"/>
+              </a:rPr>
+              <a:t>incididunt</a:t>
+            </a:r>
+            <a:r>
+              <a:rPr lang="en-US" sz="1200" dirty="0">
+                <a:latin typeface="Helvetica"/>
+                <a:cs typeface="Helvetica"/>
+              </a:rPr>
+              <a:t> </a:t>
+            </a:r>
+            <a:r>
+              <a:rPr lang="en-US" sz="1200" dirty="0" err="1">
+                <a:latin typeface="Helvetica"/>
+                <a:cs typeface="Helvetica"/>
+              </a:rPr>
+              <a:t>ut</a:t>
+            </a:r>
+            <a:r>
+              <a:rPr lang="en-US" sz="1200" dirty="0">
+                <a:latin typeface="Helvetica"/>
+                <a:cs typeface="Helvetica"/>
+              </a:rPr>
+              <a:t> </a:t>
+            </a:r>
+            <a:r>
+              <a:rPr lang="en-US" sz="1200" dirty="0" err="1">
+                <a:latin typeface="Helvetica"/>
+                <a:cs typeface="Helvetica"/>
+              </a:rPr>
+              <a:t>labore</a:t>
+            </a:r>
+            <a:r>
+              <a:rPr lang="en-US" sz="1200" dirty="0">
+                <a:latin typeface="Helvetica"/>
+                <a:cs typeface="Helvetica"/>
+              </a:rPr>
+              <a:t> et </a:t>
+            </a:r>
+            <a:r>
+              <a:rPr lang="en-US" sz="1200" dirty="0" err="1">
+                <a:latin typeface="Helvetica"/>
+                <a:cs typeface="Helvetica"/>
+              </a:rPr>
+              <a:t>dolore</a:t>
+            </a:r>
+            <a:r>
+              <a:rPr lang="en-US" sz="1200" dirty="0">
+                <a:latin typeface="Helvetica"/>
+                <a:cs typeface="Helvetica"/>
+              </a:rPr>
+              <a:t> magna </a:t>
+            </a:r>
+            <a:r>
+              <a:rPr lang="en-US" sz="1200" dirty="0" err="1">
+                <a:latin typeface="Helvetica"/>
+                <a:cs typeface="Helvetica"/>
+              </a:rPr>
+              <a:t>aliqua</a:t>
+            </a:r>
+            <a:r>
+              <a:rPr lang="en-US" sz="1200" dirty="0">
+                <a:latin typeface="Helvetica"/>
+                <a:cs typeface="Helvetica"/>
+              </a:rPr>
+              <a:t>. </a:t>
+            </a:r>
+            <a:r>
+              <a:rPr lang="en-US" sz="1200" dirty="0" err="1">
+                <a:latin typeface="Helvetica"/>
+                <a:cs typeface="Helvetica"/>
+              </a:rPr>
+              <a:t>Ut</a:t>
+            </a:r>
+            <a:r>
+              <a:rPr lang="en-US" sz="1200" dirty="0">
+                <a:latin typeface="Helvetica"/>
+                <a:cs typeface="Helvetica"/>
+              </a:rPr>
+              <a:t> </a:t>
+            </a:r>
+            <a:r>
+              <a:rPr lang="en-US" sz="1200" dirty="0" err="1">
+                <a:latin typeface="Helvetica"/>
+                <a:cs typeface="Helvetica"/>
+              </a:rPr>
+              <a:t>enim</a:t>
+            </a:r>
+            <a:r>
+              <a:rPr lang="en-US" sz="1200" dirty="0">
+                <a:latin typeface="Helvetica"/>
+                <a:cs typeface="Helvetica"/>
+              </a:rPr>
+              <a:t> ad minim </a:t>
+            </a:r>
+            <a:r>
+              <a:rPr lang="en-US" sz="1200" dirty="0" err="1">
+                <a:latin typeface="Helvetica"/>
+                <a:cs typeface="Helvetica"/>
+              </a:rPr>
+              <a:t>veniam</a:t>
+            </a:r>
+            <a:r>
+              <a:rPr lang="en-US" sz="1200" dirty="0">
+                <a:latin typeface="Helvetica"/>
+                <a:cs typeface="Helvetica"/>
+              </a:rPr>
+              <a:t>, </a:t>
+            </a:r>
+            <a:r>
+              <a:rPr lang="en-US" sz="1200" dirty="0" err="1">
+                <a:latin typeface="Helvetica"/>
+                <a:cs typeface="Helvetica"/>
+              </a:rPr>
+              <a:t>quis</a:t>
+            </a:r>
+            <a:r>
+              <a:rPr lang="en-US" sz="1200" dirty="0">
+                <a:latin typeface="Helvetica"/>
+                <a:cs typeface="Helvetica"/>
+              </a:rPr>
+              <a:t> </a:t>
+            </a:r>
+            <a:r>
+              <a:rPr lang="en-US" sz="1200" dirty="0" err="1">
+                <a:latin typeface="Helvetica"/>
+                <a:cs typeface="Helvetica"/>
+              </a:rPr>
+              <a:t>nostrud</a:t>
+            </a:r>
+            <a:r>
+              <a:rPr lang="en-US" sz="1200" dirty="0">
+                <a:latin typeface="Helvetica"/>
+                <a:cs typeface="Helvetica"/>
+              </a:rPr>
+              <a:t> exercitation </a:t>
+            </a:r>
+            <a:r>
+              <a:rPr lang="en-US" sz="1200" dirty="0" err="1">
+                <a:latin typeface="Helvetica"/>
+                <a:cs typeface="Helvetica"/>
+              </a:rPr>
+              <a:t>ullamco</a:t>
+            </a:r>
+            <a:r>
+              <a:rPr lang="en-US" sz="1200" dirty="0">
+                <a:latin typeface="Helvetica"/>
+                <a:cs typeface="Helvetica"/>
+              </a:rPr>
+              <a:t> </a:t>
+            </a:r>
+            <a:r>
+              <a:rPr lang="en-US" sz="1200" dirty="0" err="1">
+                <a:latin typeface="Helvetica"/>
+                <a:cs typeface="Helvetica"/>
+              </a:rPr>
+              <a:t>laboris</a:t>
+            </a:r>
+            <a:r>
+              <a:rPr lang="en-US" sz="1200" dirty="0">
+                <a:latin typeface="Helvetica"/>
+                <a:cs typeface="Helvetica"/>
+              </a:rPr>
+              <a:t> nisi </a:t>
+            </a:r>
+            <a:r>
+              <a:rPr lang="en-US" sz="1200" dirty="0" err="1">
+                <a:latin typeface="Helvetica"/>
+                <a:cs typeface="Helvetica"/>
+              </a:rPr>
+              <a:t>ut</a:t>
+            </a:r>
+            <a:r>
+              <a:rPr lang="en-US" sz="1200" dirty="0">
+                <a:latin typeface="Helvetica"/>
+                <a:cs typeface="Helvetica"/>
+              </a:rPr>
+              <a:t> </a:t>
+            </a:r>
+            <a:r>
+              <a:rPr lang="en-US" sz="1200" dirty="0" err="1">
+                <a:latin typeface="Helvetica"/>
+                <a:cs typeface="Helvetica"/>
+              </a:rPr>
+              <a:t>aliquip</a:t>
+            </a:r>
+            <a:r>
+              <a:rPr lang="en-US" sz="1200" dirty="0">
+                <a:latin typeface="Helvetica"/>
+                <a:cs typeface="Helvetica"/>
+              </a:rPr>
+              <a:t> ex </a:t>
+            </a:r>
+            <a:r>
+              <a:rPr lang="en-US" sz="1200" dirty="0" err="1">
+                <a:latin typeface="Helvetica"/>
+                <a:cs typeface="Helvetica"/>
+              </a:rPr>
+              <a:t>ea</a:t>
+            </a:r>
+            <a:r>
+              <a:rPr lang="en-US" sz="1200" dirty="0">
+                <a:latin typeface="Helvetica"/>
+                <a:cs typeface="Helvetica"/>
+              </a:rPr>
+              <a:t> </a:t>
+            </a:r>
+            <a:r>
+              <a:rPr lang="en-US" sz="1200" dirty="0" err="1">
+                <a:latin typeface="Helvetica"/>
+                <a:cs typeface="Helvetica"/>
+              </a:rPr>
+              <a:t>commodo</a:t>
+            </a:r>
+            <a:r>
+              <a:rPr lang="en-US" sz="1200" dirty="0">
+                <a:latin typeface="Helvetica"/>
+                <a:cs typeface="Helvetica"/>
+              </a:rPr>
+              <a:t> </a:t>
+            </a:r>
+            <a:r>
+              <a:rPr lang="en-US" sz="1200" dirty="0" err="1">
+                <a:latin typeface="Helvetica"/>
+                <a:cs typeface="Helvetica"/>
+              </a:rPr>
+              <a:t>consequat</a:t>
+            </a:r>
+            <a:r>
+              <a:rPr lang="en-US" sz="1200" dirty="0">
+                <a:latin typeface="Helvetica"/>
+                <a:cs typeface="Helvetica"/>
+              </a:rPr>
+              <a:t>. </a:t>
+            </a:r>
+            <a:endParaRPr lang="en-US" sz="1200" dirty="0" smtClean="0">
+              <a:latin typeface="Helvetica"/>
+              <a:cs typeface="Helvetica"/>
+            </a:endParaRPr>
+          </a:p>
+        </p:txBody>
+      </p:sp>
+      <p:pic>
+        <p:nvPicPr>
+          <p:cNvPr id="29" name="Picture 28" descr="screencapture-repository-library-northeastern-edu-1430517316805.png"/>
+          <p:cNvPicPr>
+            <a:picLocks noChangeAspect="1"/>
+          </p:cNvPicPr>
+          <p:nvPr/>
+        </p:nvPicPr>
+        <p:blipFill>
+          <a:blip r:embed="rId2">
+            <a:extLst>
+              <a:ext uri="{28A0092B-C50C-407E-A947-70E740481C1C}">
+                <a14:useLocalDpi xmlns:a14="http://schemas.microsoft.com/office/drawing/2010/main" val="0"/>
+              </a:ext>
+            </a:extLst>
+          </a:blip>
+          <a:stretch>
+            <a:fillRect/>
+          </a:stretch>
+        </p:blipFill>
+        <p:spPr>
+          <a:xfrm>
+            <a:off x="208948" y="2667039"/>
+            <a:ext cx="2644587" cy="1992345"/>
+          </a:xfrm>
+          <a:prstGeom prst="rect">
+            <a:avLst/>
+          </a:prstGeom>
+          <a:ln w="28575" cmpd="sng">
+            <a:solidFill>
+              <a:srgbClr val="000000"/>
+            </a:solidFill>
+          </a:ln>
+        </p:spPr>
+      </p:pic>
+      <p:pic>
+        <p:nvPicPr>
+          <p:cNvPr id="30" name="Picture 29" descr="screencapture-repository-library-northeastern-edu-1430517316805.png"/>
+          <p:cNvPicPr>
+            <a:picLocks noChangeAspect="1"/>
+          </p:cNvPicPr>
+          <p:nvPr/>
+        </p:nvPicPr>
+        <p:blipFill>
+          <a:blip r:embed="rId2">
+            <a:extLst>
+              <a:ext uri="{28A0092B-C50C-407E-A947-70E740481C1C}">
+                <a14:useLocalDpi xmlns:a14="http://schemas.microsoft.com/office/drawing/2010/main" val="0"/>
+              </a:ext>
+            </a:extLst>
+          </a:blip>
+          <a:stretch>
+            <a:fillRect/>
+          </a:stretch>
+        </p:blipFill>
+        <p:spPr>
+          <a:xfrm>
+            <a:off x="3055334" y="3561905"/>
+            <a:ext cx="2913529" cy="2194957"/>
+          </a:xfrm>
+          <a:prstGeom prst="rect">
+            <a:avLst/>
+          </a:prstGeom>
+          <a:ln w="28575" cmpd="sng">
+            <a:solidFill>
+              <a:srgbClr val="000000"/>
+            </a:solidFill>
+          </a:ln>
+        </p:spPr>
+      </p:pic>
+      <p:sp>
+        <p:nvSpPr>
+          <p:cNvPr id="31" name="TextBox 30"/>
+          <p:cNvSpPr txBox="1"/>
+          <p:nvPr/>
+        </p:nvSpPr>
+        <p:spPr>
+          <a:xfrm>
+            <a:off x="5968863" y="312032"/>
+            <a:ext cx="2951018" cy="584776"/>
           </a:xfrm>
           <a:prstGeom prst="rect">
             <a:avLst/>
@@ -4113,6 +6324,92 @@
           <a:noFill/>
         </p:spPr>
         <p:txBody>
+          <a:bodyPr wrap="square" rtlCol="0" anchor="ctr">
+            <a:spAutoFit/>
+          </a:bodyPr>
+          <a:lstStyle/>
+          <a:p>
+            <a:pPr algn="r"/>
+            <a:r>
+              <a:rPr lang="en-US" sz="1600" dirty="0" smtClean="0">
+                <a:solidFill>
+                  <a:srgbClr val="1C2939"/>
+                </a:solidFill>
+                <a:latin typeface="Garamond"/>
+                <a:cs typeface="Garamond"/>
+              </a:rPr>
+              <a:t>Sarah Sweeney</a:t>
+            </a:r>
+          </a:p>
+          <a:p>
+            <a:pPr algn="r"/>
+            <a:r>
+              <a:rPr lang="en-US" sz="1600" dirty="0" smtClean="0">
+                <a:solidFill>
+                  <a:srgbClr val="1C2939"/>
+                </a:solidFill>
+                <a:latin typeface="Garamond"/>
+                <a:cs typeface="Garamond"/>
+              </a:rPr>
+              <a:t>Northeastern University Libraries</a:t>
+            </a:r>
+            <a:endParaRPr lang="en-US" sz="1600" dirty="0">
+              <a:solidFill>
+                <a:srgbClr val="1C2939"/>
+              </a:solidFill>
+              <a:latin typeface="Garamond"/>
+              <a:cs typeface="Garamond"/>
+            </a:endParaRPr>
+          </a:p>
+        </p:txBody>
+      </p:sp>
+      <p:pic>
+        <p:nvPicPr>
+          <p:cNvPr id="34" name="Picture 33" descr="2015-05-02_2004.png"/>
+          <p:cNvPicPr>
+            <a:picLocks noChangeAspect="1"/>
+          </p:cNvPicPr>
+          <p:nvPr/>
+        </p:nvPicPr>
+        <p:blipFill>
+          <a:blip r:embed="rId3">
+            <a:extLst>
+              <a:ext uri="{28A0092B-C50C-407E-A947-70E740481C1C}">
+                <a14:useLocalDpi xmlns:a14="http://schemas.microsoft.com/office/drawing/2010/main" val="0"/>
+              </a:ext>
+            </a:extLst>
+          </a:blip>
+          <a:stretch>
+            <a:fillRect/>
+          </a:stretch>
+        </p:blipFill>
+        <p:spPr>
+          <a:xfrm>
+            <a:off x="5050118" y="5957657"/>
+            <a:ext cx="3869763" cy="637787"/>
+          </a:xfrm>
+          <a:prstGeom prst="rect">
+            <a:avLst/>
+          </a:prstGeom>
+        </p:spPr>
+      </p:pic>
+      <p:sp>
+        <p:nvSpPr>
+          <p:cNvPr id="35" name="TextBox 34"/>
+          <p:cNvSpPr txBox="1"/>
+          <p:nvPr/>
+        </p:nvSpPr>
+        <p:spPr>
+          <a:xfrm>
+            <a:off x="5199529" y="6507033"/>
+            <a:ext cx="3829596" cy="307777"/>
+          </a:xfrm>
+          <a:prstGeom prst="rect">
+            <a:avLst/>
+          </a:prstGeom>
+          <a:noFill/>
+        </p:spPr>
+        <p:txBody>
           <a:bodyPr wrap="square" rtlCol="0">
             <a:spAutoFit/>
           </a:bodyPr>
@@ -4120,7 +6417,7 @@
           <a:p>
             <a:pPr algn="ctr"/>
             <a:r>
-              <a:rPr lang="en-US" sz="3600" dirty="0">
+              <a:rPr lang="en-US" sz="1400" dirty="0">
                 <a:solidFill>
                   <a:schemeClr val="accent1">
                     <a:lumMod val="75000"/>
@@ -4132,7 +6429,7 @@
               <a:t>https://</a:t>
             </a:r>
             <a:r>
-              <a:rPr lang="en-US" sz="3600" dirty="0" err="1" smtClean="0">
+              <a:rPr lang="en-US" sz="1400" dirty="0" err="1" smtClean="0">
                 <a:solidFill>
                   <a:schemeClr val="accent1">
                     <a:lumMod val="75000"/>
@@ -4143,7 +6440,7 @@
               </a:rPr>
               <a:t>repository.library.northeastern.edu</a:t>
             </a:r>
-            <a:endParaRPr lang="en-US" sz="3600" dirty="0">
+            <a:endParaRPr lang="en-US" sz="1400" dirty="0">
               <a:solidFill>
                 <a:schemeClr val="accent1">
                   <a:lumMod val="75000"/>
@@ -4158,7 +6455,7 @@
     </p:spTree>
     <p:extLst>
       <p:ext uri="{BB962C8B-B14F-4D97-AF65-F5344CB8AC3E}">
-        <p14:creationId xmlns:p14="http://schemas.microsoft.com/office/powerpoint/2010/main" val="763028979"/>
+        <p14:creationId xmlns:p14="http://schemas.microsoft.com/office/powerpoint/2010/main" val="1649770617"/>
       </p:ext>
     </p:extLst>
   </p:cSld>

</xml_diff>